<commit_message>
Update the slides to startup
</commit_message>
<xml_diff>
--- a/ArchCA.pptx
+++ b/ArchCA.pptx
@@ -1,20 +1,21 @@
 
 <file path=ppt/presentation.xml><?xml version="1.0" encoding="utf-8"?>
-<p:presentation xmlns:a="http://schemas.openxmlformats.org/drawingml/2006/main" xmlns:r="http://schemas.openxmlformats.org/officeDocument/2006/relationships" xmlns:p="http://schemas.openxmlformats.org/presentationml/2006/main" saveSubsetFonts="1">
+<p:presentation xmlns:a="http://schemas.openxmlformats.org/drawingml/2006/main" xmlns:r="http://schemas.openxmlformats.org/officeDocument/2006/relationships" xmlns:p="http://schemas.openxmlformats.org/presentationml/2006/main">
   <p:sldMasterIdLst>
-    <p:sldMasterId id="2147483689" r:id="rId1"/>
+    <p:sldMasterId id="2147483648" r:id="rId1"/>
   </p:sldMasterIdLst>
   <p:sldIdLst>
-    <p:sldId id="256" r:id="rId2"/>
-    <p:sldId id="258" r:id="rId3"/>
-    <p:sldId id="257" r:id="rId4"/>
-    <p:sldId id="259" r:id="rId5"/>
-    <p:sldId id="260" r:id="rId6"/>
-    <p:sldId id="261" r:id="rId7"/>
-    <p:sldId id="262" r:id="rId8"/>
-    <p:sldId id="263" r:id="rId9"/>
-    <p:sldId id="264" r:id="rId10"/>
-    <p:sldId id="265" r:id="rId11"/>
+    <p:sldId id="256" r:id="rId3"/>
+    <p:sldId id="258" r:id="rId4"/>
+    <p:sldId id="257" r:id="rId5"/>
+    <p:sldId id="259" r:id="rId6"/>
+    <p:sldId id="260" r:id="rId7"/>
+    <p:sldId id="261" r:id="rId8"/>
+    <p:sldId id="267" r:id="rId9"/>
+    <p:sldId id="262" r:id="rId10"/>
+    <p:sldId id="263" r:id="rId11"/>
+    <p:sldId id="264" r:id="rId12"/>
+    <p:sldId id="265" r:id="rId13"/>
   </p:sldIdLst>
   <p:sldSz cx="12192000" cy="6858000"/>
   <p:notesSz cx="6858000" cy="9144000"/>
@@ -116,10 +117,6 @@
 </p:presentation>
 </file>
 
-<file path=ppt/revisionInfo.xml><?xml version="1.0" encoding="utf-8"?>
-<p1510:revInfo xmlns:a="http://schemas.openxmlformats.org/drawingml/2006/main" xmlns:r="http://schemas.openxmlformats.org/officeDocument/2006/relationships" xmlns:p1510="http://schemas.microsoft.com/office/powerpoint/2015/10/main"/>
-</file>
-
 <file path=ppt/slideLayouts/slideLayout1.xml><?xml version="1.0" encoding="utf-8"?>
 <p:sldLayout xmlns:a="http://schemas.openxmlformats.org/drawingml/2006/main" xmlns:r="http://schemas.openxmlformats.org/officeDocument/2006/relationships" xmlns:p="http://schemas.openxmlformats.org/presentationml/2006/main" type="title" preserve="1">
   <p:cSld name="Title Slide">
@@ -139,13 +136,7 @@
       </p:grpSpPr>
       <p:sp>
         <p:nvSpPr>
-          <p:cNvPr id="2" name="Title 1">
-            <a:extLst>
-              <a:ext uri="{FF2B5EF4-FFF2-40B4-BE49-F238E27FC236}">
-                <a16:creationId xmlns:a16="http://schemas.microsoft.com/office/drawing/2014/main" id="{BD744C7C-D6F3-4CCD-BEFD-E69900C956C3}"/>
-              </a:ext>
-            </a:extLst>
-          </p:cNvPr>
+          <p:cNvPr id="2" name="Title 1"/>
           <p:cNvSpPr>
             <a:spLocks noGrp="1"/>
           </p:cNvSpPr>
@@ -177,13 +168,7 @@
       </p:sp>
       <p:sp>
         <p:nvSpPr>
-          <p:cNvPr id="3" name="Subtitle 2">
-            <a:extLst>
-              <a:ext uri="{FF2B5EF4-FFF2-40B4-BE49-F238E27FC236}">
-                <a16:creationId xmlns:a16="http://schemas.microsoft.com/office/drawing/2014/main" id="{2492B1EF-8D62-4C03-B48D-5A1F9ACCFB58}"/>
-              </a:ext>
-            </a:extLst>
-          </p:cNvPr>
+          <p:cNvPr id="3" name="Subtitle 2"/>
           <p:cNvSpPr>
             <a:spLocks noGrp="1"/>
           </p:cNvSpPr>
@@ -248,13 +233,7 @@
       </p:sp>
       <p:sp>
         <p:nvSpPr>
-          <p:cNvPr id="4" name="Date Placeholder 3">
-            <a:extLst>
-              <a:ext uri="{FF2B5EF4-FFF2-40B4-BE49-F238E27FC236}">
-                <a16:creationId xmlns:a16="http://schemas.microsoft.com/office/drawing/2014/main" id="{8669E712-1BE8-4777-A9C0-C34FD29F5D79}"/>
-              </a:ext>
-            </a:extLst>
-          </p:cNvPr>
+          <p:cNvPr id="4" name="Date Placeholder 3"/>
           <p:cNvSpPr>
             <a:spLocks noGrp="1"/>
           </p:cNvSpPr>
@@ -269,7 +248,6 @@
           <a:p>
             <a:fld id="{DEB5C0FF-D3D9-4BDF-BFFB-33E9B8DC3C76}" type="datetimeFigureOut">
               <a:rPr lang="en-SG" smtClean="0"/>
-              <a:t>27/9/2017</a:t>
             </a:fld>
             <a:endParaRPr lang="en-SG"/>
           </a:p>
@@ -277,13 +255,7 @@
       </p:sp>
       <p:sp>
         <p:nvSpPr>
-          <p:cNvPr id="5" name="Footer Placeholder 4">
-            <a:extLst>
-              <a:ext uri="{FF2B5EF4-FFF2-40B4-BE49-F238E27FC236}">
-                <a16:creationId xmlns:a16="http://schemas.microsoft.com/office/drawing/2014/main" id="{735E6FA3-A9E9-4F45-BF27-19B05F198D53}"/>
-              </a:ext>
-            </a:extLst>
-          </p:cNvPr>
+          <p:cNvPr id="5" name="Footer Placeholder 4"/>
           <p:cNvSpPr>
             <a:spLocks noGrp="1"/>
           </p:cNvSpPr>
@@ -302,13 +274,7 @@
       </p:sp>
       <p:sp>
         <p:nvSpPr>
-          <p:cNvPr id="6" name="Slide Number Placeholder 5">
-            <a:extLst>
-              <a:ext uri="{FF2B5EF4-FFF2-40B4-BE49-F238E27FC236}">
-                <a16:creationId xmlns:a16="http://schemas.microsoft.com/office/drawing/2014/main" id="{59FD8507-495A-46A1-8140-CFB4749B65BC}"/>
-              </a:ext>
-            </a:extLst>
-          </p:cNvPr>
+          <p:cNvPr id="6" name="Slide Number Placeholder 5"/>
           <p:cNvSpPr>
             <a:spLocks noGrp="1"/>
           </p:cNvSpPr>
@@ -323,18 +289,12 @@
           <a:p>
             <a:fld id="{956F4D74-276B-431A-85B2-E0F4CCEF394D}" type="slidenum">
               <a:rPr lang="en-SG" smtClean="0"/>
-              <a:t>‹#›</a:t>
             </a:fld>
             <a:endParaRPr lang="en-SG"/>
           </a:p>
         </p:txBody>
       </p:sp>
     </p:spTree>
-    <p:extLst>
-      <p:ext uri="{BB962C8B-B14F-4D97-AF65-F5344CB8AC3E}">
-        <p14:creationId xmlns:p14="http://schemas.microsoft.com/office/powerpoint/2010/main" val="1822422310"/>
-      </p:ext>
-    </p:extLst>
   </p:cSld>
   <p:clrMapOvr>
     <a:masterClrMapping/>
@@ -361,13 +321,7 @@
       </p:grpSpPr>
       <p:sp>
         <p:nvSpPr>
-          <p:cNvPr id="2" name="Title 1">
-            <a:extLst>
-              <a:ext uri="{FF2B5EF4-FFF2-40B4-BE49-F238E27FC236}">
-                <a16:creationId xmlns:a16="http://schemas.microsoft.com/office/drawing/2014/main" id="{CEF036F2-A94B-4432-A8B1-FFC37A20C131}"/>
-              </a:ext>
-            </a:extLst>
-          </p:cNvPr>
+          <p:cNvPr id="2" name="Title 1"/>
           <p:cNvSpPr>
             <a:spLocks noGrp="1"/>
           </p:cNvSpPr>
@@ -390,13 +344,7 @@
       </p:sp>
       <p:sp>
         <p:nvSpPr>
-          <p:cNvPr id="3" name="Vertical Text Placeholder 2">
-            <a:extLst>
-              <a:ext uri="{FF2B5EF4-FFF2-40B4-BE49-F238E27FC236}">
-                <a16:creationId xmlns:a16="http://schemas.microsoft.com/office/drawing/2014/main" id="{6846AEB4-A0E5-4F88-A79C-ABF61D632A12}"/>
-              </a:ext>
-            </a:extLst>
-          </p:cNvPr>
+          <p:cNvPr id="3" name="Vertical Text Placeholder 2"/>
           <p:cNvSpPr>
             <a:spLocks noGrp="1"/>
           </p:cNvSpPr>
@@ -414,6 +362,7 @@
               <a:rPr lang="en-US"/>
               <a:t>Edit Master text styles</a:t>
             </a:r>
+            <a:endParaRPr lang="en-US"/>
           </a:p>
           <a:p>
             <a:pPr lvl="1"/>
@@ -421,6 +370,7 @@
               <a:rPr lang="en-US"/>
               <a:t>Second level</a:t>
             </a:r>
+            <a:endParaRPr lang="en-US"/>
           </a:p>
           <a:p>
             <a:pPr lvl="2"/>
@@ -428,6 +378,7 @@
               <a:rPr lang="en-US"/>
               <a:t>Third level</a:t>
             </a:r>
+            <a:endParaRPr lang="en-US"/>
           </a:p>
           <a:p>
             <a:pPr lvl="3"/>
@@ -435,6 +386,7 @@
               <a:rPr lang="en-US"/>
               <a:t>Fourth level</a:t>
             </a:r>
+            <a:endParaRPr lang="en-US"/>
           </a:p>
           <a:p>
             <a:pPr lvl="4"/>
@@ -448,13 +400,7 @@
       </p:sp>
       <p:sp>
         <p:nvSpPr>
-          <p:cNvPr id="4" name="Date Placeholder 3">
-            <a:extLst>
-              <a:ext uri="{FF2B5EF4-FFF2-40B4-BE49-F238E27FC236}">
-                <a16:creationId xmlns:a16="http://schemas.microsoft.com/office/drawing/2014/main" id="{0C12A514-78F2-4F37-9C81-2A5ADC78948A}"/>
-              </a:ext>
-            </a:extLst>
-          </p:cNvPr>
+          <p:cNvPr id="4" name="Date Placeholder 3"/>
           <p:cNvSpPr>
             <a:spLocks noGrp="1"/>
           </p:cNvSpPr>
@@ -469,7 +415,6 @@
           <a:p>
             <a:fld id="{DEB5C0FF-D3D9-4BDF-BFFB-33E9B8DC3C76}" type="datetimeFigureOut">
               <a:rPr lang="en-SG" smtClean="0"/>
-              <a:t>27/9/2017</a:t>
             </a:fld>
             <a:endParaRPr lang="en-SG"/>
           </a:p>
@@ -477,13 +422,7 @@
       </p:sp>
       <p:sp>
         <p:nvSpPr>
-          <p:cNvPr id="5" name="Footer Placeholder 4">
-            <a:extLst>
-              <a:ext uri="{FF2B5EF4-FFF2-40B4-BE49-F238E27FC236}">
-                <a16:creationId xmlns:a16="http://schemas.microsoft.com/office/drawing/2014/main" id="{FA74A3F6-140B-4D88-B7C4-67EB87CA3834}"/>
-              </a:ext>
-            </a:extLst>
-          </p:cNvPr>
+          <p:cNvPr id="5" name="Footer Placeholder 4"/>
           <p:cNvSpPr>
             <a:spLocks noGrp="1"/>
           </p:cNvSpPr>
@@ -502,13 +441,7 @@
       </p:sp>
       <p:sp>
         <p:nvSpPr>
-          <p:cNvPr id="6" name="Slide Number Placeholder 5">
-            <a:extLst>
-              <a:ext uri="{FF2B5EF4-FFF2-40B4-BE49-F238E27FC236}">
-                <a16:creationId xmlns:a16="http://schemas.microsoft.com/office/drawing/2014/main" id="{011F7506-4153-4971-A873-245B7033CF02}"/>
-              </a:ext>
-            </a:extLst>
-          </p:cNvPr>
+          <p:cNvPr id="6" name="Slide Number Placeholder 5"/>
           <p:cNvSpPr>
             <a:spLocks noGrp="1"/>
           </p:cNvSpPr>
@@ -523,18 +456,12 @@
           <a:p>
             <a:fld id="{956F4D74-276B-431A-85B2-E0F4CCEF394D}" type="slidenum">
               <a:rPr lang="en-SG" smtClean="0"/>
-              <a:t>‹#›</a:t>
             </a:fld>
             <a:endParaRPr lang="en-SG"/>
           </a:p>
         </p:txBody>
       </p:sp>
     </p:spTree>
-    <p:extLst>
-      <p:ext uri="{BB962C8B-B14F-4D97-AF65-F5344CB8AC3E}">
-        <p14:creationId xmlns:p14="http://schemas.microsoft.com/office/powerpoint/2010/main" val="765763666"/>
-      </p:ext>
-    </p:extLst>
   </p:cSld>
   <p:clrMapOvr>
     <a:masterClrMapping/>
@@ -561,13 +488,7 @@
       </p:grpSpPr>
       <p:sp>
         <p:nvSpPr>
-          <p:cNvPr id="2" name="Vertical Title 1">
-            <a:extLst>
-              <a:ext uri="{FF2B5EF4-FFF2-40B4-BE49-F238E27FC236}">
-                <a16:creationId xmlns:a16="http://schemas.microsoft.com/office/drawing/2014/main" id="{D01549ED-1497-4382-A44E-AA8263A08DF7}"/>
-              </a:ext>
-            </a:extLst>
-          </p:cNvPr>
+          <p:cNvPr id="2" name="Vertical Title 1"/>
           <p:cNvSpPr>
             <a:spLocks noGrp="1"/>
           </p:cNvSpPr>
@@ -595,13 +516,7 @@
       </p:sp>
       <p:sp>
         <p:nvSpPr>
-          <p:cNvPr id="3" name="Vertical Text Placeholder 2">
-            <a:extLst>
-              <a:ext uri="{FF2B5EF4-FFF2-40B4-BE49-F238E27FC236}">
-                <a16:creationId xmlns:a16="http://schemas.microsoft.com/office/drawing/2014/main" id="{BF64988B-65FB-4191-9733-127346B1006F}"/>
-              </a:ext>
-            </a:extLst>
-          </p:cNvPr>
+          <p:cNvPr id="3" name="Vertical Text Placeholder 2"/>
           <p:cNvSpPr>
             <a:spLocks noGrp="1"/>
           </p:cNvSpPr>
@@ -624,6 +539,7 @@
               <a:rPr lang="en-US"/>
               <a:t>Edit Master text styles</a:t>
             </a:r>
+            <a:endParaRPr lang="en-US"/>
           </a:p>
           <a:p>
             <a:pPr lvl="1"/>
@@ -631,6 +547,7 @@
               <a:rPr lang="en-US"/>
               <a:t>Second level</a:t>
             </a:r>
+            <a:endParaRPr lang="en-US"/>
           </a:p>
           <a:p>
             <a:pPr lvl="2"/>
@@ -638,6 +555,7 @@
               <a:rPr lang="en-US"/>
               <a:t>Third level</a:t>
             </a:r>
+            <a:endParaRPr lang="en-US"/>
           </a:p>
           <a:p>
             <a:pPr lvl="3"/>
@@ -645,6 +563,7 @@
               <a:rPr lang="en-US"/>
               <a:t>Fourth level</a:t>
             </a:r>
+            <a:endParaRPr lang="en-US"/>
           </a:p>
           <a:p>
             <a:pPr lvl="4"/>
@@ -658,13 +577,7 @@
       </p:sp>
       <p:sp>
         <p:nvSpPr>
-          <p:cNvPr id="4" name="Date Placeholder 3">
-            <a:extLst>
-              <a:ext uri="{FF2B5EF4-FFF2-40B4-BE49-F238E27FC236}">
-                <a16:creationId xmlns:a16="http://schemas.microsoft.com/office/drawing/2014/main" id="{C32A68DC-AD08-4121-B986-A9CAF339D45B}"/>
-              </a:ext>
-            </a:extLst>
-          </p:cNvPr>
+          <p:cNvPr id="4" name="Date Placeholder 3"/>
           <p:cNvSpPr>
             <a:spLocks noGrp="1"/>
           </p:cNvSpPr>
@@ -679,7 +592,6 @@
           <a:p>
             <a:fld id="{DEB5C0FF-D3D9-4BDF-BFFB-33E9B8DC3C76}" type="datetimeFigureOut">
               <a:rPr lang="en-SG" smtClean="0"/>
-              <a:t>27/9/2017</a:t>
             </a:fld>
             <a:endParaRPr lang="en-SG"/>
           </a:p>
@@ -687,13 +599,7 @@
       </p:sp>
       <p:sp>
         <p:nvSpPr>
-          <p:cNvPr id="5" name="Footer Placeholder 4">
-            <a:extLst>
-              <a:ext uri="{FF2B5EF4-FFF2-40B4-BE49-F238E27FC236}">
-                <a16:creationId xmlns:a16="http://schemas.microsoft.com/office/drawing/2014/main" id="{17055F23-2A50-4F34-A30F-CABC543EFDD6}"/>
-              </a:ext>
-            </a:extLst>
-          </p:cNvPr>
+          <p:cNvPr id="5" name="Footer Placeholder 4"/>
           <p:cNvSpPr>
             <a:spLocks noGrp="1"/>
           </p:cNvSpPr>
@@ -712,13 +618,7 @@
       </p:sp>
       <p:sp>
         <p:nvSpPr>
-          <p:cNvPr id="6" name="Slide Number Placeholder 5">
-            <a:extLst>
-              <a:ext uri="{FF2B5EF4-FFF2-40B4-BE49-F238E27FC236}">
-                <a16:creationId xmlns:a16="http://schemas.microsoft.com/office/drawing/2014/main" id="{B8D7721A-85B2-49A4-BA33-3861BC788459}"/>
-              </a:ext>
-            </a:extLst>
-          </p:cNvPr>
+          <p:cNvPr id="6" name="Slide Number Placeholder 5"/>
           <p:cNvSpPr>
             <a:spLocks noGrp="1"/>
           </p:cNvSpPr>
@@ -733,18 +633,12 @@
           <a:p>
             <a:fld id="{956F4D74-276B-431A-85B2-E0F4CCEF394D}" type="slidenum">
               <a:rPr lang="en-SG" smtClean="0"/>
-              <a:t>‹#›</a:t>
             </a:fld>
             <a:endParaRPr lang="en-SG"/>
           </a:p>
         </p:txBody>
       </p:sp>
     </p:spTree>
-    <p:extLst>
-      <p:ext uri="{BB962C8B-B14F-4D97-AF65-F5344CB8AC3E}">
-        <p14:creationId xmlns:p14="http://schemas.microsoft.com/office/powerpoint/2010/main" val="1997302107"/>
-      </p:ext>
-    </p:extLst>
   </p:cSld>
   <p:clrMapOvr>
     <a:masterClrMapping/>
@@ -771,13 +665,7 @@
       </p:grpSpPr>
       <p:sp>
         <p:nvSpPr>
-          <p:cNvPr id="2" name="Title 1">
-            <a:extLst>
-              <a:ext uri="{FF2B5EF4-FFF2-40B4-BE49-F238E27FC236}">
-                <a16:creationId xmlns:a16="http://schemas.microsoft.com/office/drawing/2014/main" id="{1205B6F9-62BF-42B9-9480-387461DD4B37}"/>
-              </a:ext>
-            </a:extLst>
-          </p:cNvPr>
+          <p:cNvPr id="2" name="Title 1"/>
           <p:cNvSpPr>
             <a:spLocks noGrp="1"/>
           </p:cNvSpPr>
@@ -800,13 +688,7 @@
       </p:sp>
       <p:sp>
         <p:nvSpPr>
-          <p:cNvPr id="3" name="Content Placeholder 2">
-            <a:extLst>
-              <a:ext uri="{FF2B5EF4-FFF2-40B4-BE49-F238E27FC236}">
-                <a16:creationId xmlns:a16="http://schemas.microsoft.com/office/drawing/2014/main" id="{E57AE19A-411B-4A33-A73A-3AA6D2AB7633}"/>
-              </a:ext>
-            </a:extLst>
-          </p:cNvPr>
+          <p:cNvPr id="3" name="Content Placeholder 2"/>
           <p:cNvSpPr>
             <a:spLocks noGrp="1"/>
           </p:cNvSpPr>
@@ -824,6 +706,7 @@
               <a:rPr lang="en-US"/>
               <a:t>Edit Master text styles</a:t>
             </a:r>
+            <a:endParaRPr lang="en-US"/>
           </a:p>
           <a:p>
             <a:pPr lvl="1"/>
@@ -831,6 +714,7 @@
               <a:rPr lang="en-US"/>
               <a:t>Second level</a:t>
             </a:r>
+            <a:endParaRPr lang="en-US"/>
           </a:p>
           <a:p>
             <a:pPr lvl="2"/>
@@ -838,6 +722,7 @@
               <a:rPr lang="en-US"/>
               <a:t>Third level</a:t>
             </a:r>
+            <a:endParaRPr lang="en-US"/>
           </a:p>
           <a:p>
             <a:pPr lvl="3"/>
@@ -845,6 +730,7 @@
               <a:rPr lang="en-US"/>
               <a:t>Fourth level</a:t>
             </a:r>
+            <a:endParaRPr lang="en-US"/>
           </a:p>
           <a:p>
             <a:pPr lvl="4"/>
@@ -858,13 +744,7 @@
       </p:sp>
       <p:sp>
         <p:nvSpPr>
-          <p:cNvPr id="4" name="Date Placeholder 3">
-            <a:extLst>
-              <a:ext uri="{FF2B5EF4-FFF2-40B4-BE49-F238E27FC236}">
-                <a16:creationId xmlns:a16="http://schemas.microsoft.com/office/drawing/2014/main" id="{CFB2C21B-5EE8-4AE7-99E6-9EE23643AD90}"/>
-              </a:ext>
-            </a:extLst>
-          </p:cNvPr>
+          <p:cNvPr id="4" name="Date Placeholder 3"/>
           <p:cNvSpPr>
             <a:spLocks noGrp="1"/>
           </p:cNvSpPr>
@@ -879,7 +759,6 @@
           <a:p>
             <a:fld id="{DEB5C0FF-D3D9-4BDF-BFFB-33E9B8DC3C76}" type="datetimeFigureOut">
               <a:rPr lang="en-SG" smtClean="0"/>
-              <a:t>27/9/2017</a:t>
             </a:fld>
             <a:endParaRPr lang="en-SG"/>
           </a:p>
@@ -887,13 +766,7 @@
       </p:sp>
       <p:sp>
         <p:nvSpPr>
-          <p:cNvPr id="5" name="Footer Placeholder 4">
-            <a:extLst>
-              <a:ext uri="{FF2B5EF4-FFF2-40B4-BE49-F238E27FC236}">
-                <a16:creationId xmlns:a16="http://schemas.microsoft.com/office/drawing/2014/main" id="{CDC6EBB5-C6A6-4154-ADFA-4D5CDEB75A37}"/>
-              </a:ext>
-            </a:extLst>
-          </p:cNvPr>
+          <p:cNvPr id="5" name="Footer Placeholder 4"/>
           <p:cNvSpPr>
             <a:spLocks noGrp="1"/>
           </p:cNvSpPr>
@@ -912,13 +785,7 @@
       </p:sp>
       <p:sp>
         <p:nvSpPr>
-          <p:cNvPr id="6" name="Slide Number Placeholder 5">
-            <a:extLst>
-              <a:ext uri="{FF2B5EF4-FFF2-40B4-BE49-F238E27FC236}">
-                <a16:creationId xmlns:a16="http://schemas.microsoft.com/office/drawing/2014/main" id="{A2E8AE6B-0AFC-403A-BBDA-76CC30997D09}"/>
-              </a:ext>
-            </a:extLst>
-          </p:cNvPr>
+          <p:cNvPr id="6" name="Slide Number Placeholder 5"/>
           <p:cNvSpPr>
             <a:spLocks noGrp="1"/>
           </p:cNvSpPr>
@@ -933,18 +800,12 @@
           <a:p>
             <a:fld id="{956F4D74-276B-431A-85B2-E0F4CCEF394D}" type="slidenum">
               <a:rPr lang="en-SG" smtClean="0"/>
-              <a:t>‹#›</a:t>
             </a:fld>
             <a:endParaRPr lang="en-SG"/>
           </a:p>
         </p:txBody>
       </p:sp>
     </p:spTree>
-    <p:extLst>
-      <p:ext uri="{BB962C8B-B14F-4D97-AF65-F5344CB8AC3E}">
-        <p14:creationId xmlns:p14="http://schemas.microsoft.com/office/powerpoint/2010/main" val="1933776450"/>
-      </p:ext>
-    </p:extLst>
   </p:cSld>
   <p:clrMapOvr>
     <a:masterClrMapping/>
@@ -971,13 +832,7 @@
       </p:grpSpPr>
       <p:sp>
         <p:nvSpPr>
-          <p:cNvPr id="2" name="Title 1">
-            <a:extLst>
-              <a:ext uri="{FF2B5EF4-FFF2-40B4-BE49-F238E27FC236}">
-                <a16:creationId xmlns:a16="http://schemas.microsoft.com/office/drawing/2014/main" id="{C8C12EDF-B1E7-49B6-B5F3-2F8B8F0E6F5B}"/>
-              </a:ext>
-            </a:extLst>
-          </p:cNvPr>
+          <p:cNvPr id="2" name="Title 1"/>
           <p:cNvSpPr>
             <a:spLocks noGrp="1"/>
           </p:cNvSpPr>
@@ -1009,13 +864,7 @@
       </p:sp>
       <p:sp>
         <p:nvSpPr>
-          <p:cNvPr id="3" name="Text Placeholder 2">
-            <a:extLst>
-              <a:ext uri="{FF2B5EF4-FFF2-40B4-BE49-F238E27FC236}">
-                <a16:creationId xmlns:a16="http://schemas.microsoft.com/office/drawing/2014/main" id="{51A8B5EC-BEF0-4DFB-8972-8EBD35561DDA}"/>
-              </a:ext>
-            </a:extLst>
-          </p:cNvPr>
+          <p:cNvPr id="3" name="Text Placeholder 2"/>
           <p:cNvSpPr>
             <a:spLocks noGrp="1"/>
           </p:cNvSpPr>
@@ -1129,18 +978,13 @@
               <a:rPr lang="en-US"/>
               <a:t>Edit Master text styles</a:t>
             </a:r>
-          </a:p>
-        </p:txBody>
-      </p:sp>
-      <p:sp>
-        <p:nvSpPr>
-          <p:cNvPr id="4" name="Date Placeholder 3">
-            <a:extLst>
-              <a:ext uri="{FF2B5EF4-FFF2-40B4-BE49-F238E27FC236}">
-                <a16:creationId xmlns:a16="http://schemas.microsoft.com/office/drawing/2014/main" id="{6C75181F-A4DC-47BF-B319-FF05208FD7F3}"/>
-              </a:ext>
-            </a:extLst>
-          </p:cNvPr>
+            <a:endParaRPr lang="en-US"/>
+          </a:p>
+        </p:txBody>
+      </p:sp>
+      <p:sp>
+        <p:nvSpPr>
+          <p:cNvPr id="4" name="Date Placeholder 3"/>
           <p:cNvSpPr>
             <a:spLocks noGrp="1"/>
           </p:cNvSpPr>
@@ -1155,7 +999,6 @@
           <a:p>
             <a:fld id="{DEB5C0FF-D3D9-4BDF-BFFB-33E9B8DC3C76}" type="datetimeFigureOut">
               <a:rPr lang="en-SG" smtClean="0"/>
-              <a:t>27/9/2017</a:t>
             </a:fld>
             <a:endParaRPr lang="en-SG"/>
           </a:p>
@@ -1163,13 +1006,7 @@
       </p:sp>
       <p:sp>
         <p:nvSpPr>
-          <p:cNvPr id="5" name="Footer Placeholder 4">
-            <a:extLst>
-              <a:ext uri="{FF2B5EF4-FFF2-40B4-BE49-F238E27FC236}">
-                <a16:creationId xmlns:a16="http://schemas.microsoft.com/office/drawing/2014/main" id="{3016EB85-9469-48FD-B22C-27F7581E53B8}"/>
-              </a:ext>
-            </a:extLst>
-          </p:cNvPr>
+          <p:cNvPr id="5" name="Footer Placeholder 4"/>
           <p:cNvSpPr>
             <a:spLocks noGrp="1"/>
           </p:cNvSpPr>
@@ -1188,13 +1025,7 @@
       </p:sp>
       <p:sp>
         <p:nvSpPr>
-          <p:cNvPr id="6" name="Slide Number Placeholder 5">
-            <a:extLst>
-              <a:ext uri="{FF2B5EF4-FFF2-40B4-BE49-F238E27FC236}">
-                <a16:creationId xmlns:a16="http://schemas.microsoft.com/office/drawing/2014/main" id="{4433864A-70D2-4277-B51D-1C28FB18CB62}"/>
-              </a:ext>
-            </a:extLst>
-          </p:cNvPr>
+          <p:cNvPr id="6" name="Slide Number Placeholder 5"/>
           <p:cNvSpPr>
             <a:spLocks noGrp="1"/>
           </p:cNvSpPr>
@@ -1209,18 +1040,12 @@
           <a:p>
             <a:fld id="{956F4D74-276B-431A-85B2-E0F4CCEF394D}" type="slidenum">
               <a:rPr lang="en-SG" smtClean="0"/>
-              <a:t>‹#›</a:t>
             </a:fld>
             <a:endParaRPr lang="en-SG"/>
           </a:p>
         </p:txBody>
       </p:sp>
     </p:spTree>
-    <p:extLst>
-      <p:ext uri="{BB962C8B-B14F-4D97-AF65-F5344CB8AC3E}">
-        <p14:creationId xmlns:p14="http://schemas.microsoft.com/office/powerpoint/2010/main" val="1280151440"/>
-      </p:ext>
-    </p:extLst>
   </p:cSld>
   <p:clrMapOvr>
     <a:masterClrMapping/>
@@ -1247,13 +1072,7 @@
       </p:grpSpPr>
       <p:sp>
         <p:nvSpPr>
-          <p:cNvPr id="2" name="Title 1">
-            <a:extLst>
-              <a:ext uri="{FF2B5EF4-FFF2-40B4-BE49-F238E27FC236}">
-                <a16:creationId xmlns:a16="http://schemas.microsoft.com/office/drawing/2014/main" id="{65115246-4295-40B4-AC16-06B1CF5B2820}"/>
-              </a:ext>
-            </a:extLst>
-          </p:cNvPr>
+          <p:cNvPr id="2" name="Title 1"/>
           <p:cNvSpPr>
             <a:spLocks noGrp="1"/>
           </p:cNvSpPr>
@@ -1276,13 +1095,7 @@
       </p:sp>
       <p:sp>
         <p:nvSpPr>
-          <p:cNvPr id="3" name="Content Placeholder 2">
-            <a:extLst>
-              <a:ext uri="{FF2B5EF4-FFF2-40B4-BE49-F238E27FC236}">
-                <a16:creationId xmlns:a16="http://schemas.microsoft.com/office/drawing/2014/main" id="{29F6DD26-58DC-40F0-841A-D5C275B6A9E1}"/>
-              </a:ext>
-            </a:extLst>
-          </p:cNvPr>
+          <p:cNvPr id="3" name="Content Placeholder 2"/>
           <p:cNvSpPr>
             <a:spLocks noGrp="1"/>
           </p:cNvSpPr>
@@ -1305,6 +1118,7 @@
               <a:rPr lang="en-US"/>
               <a:t>Edit Master text styles</a:t>
             </a:r>
+            <a:endParaRPr lang="en-US"/>
           </a:p>
           <a:p>
             <a:pPr lvl="1"/>
@@ -1312,6 +1126,7 @@
               <a:rPr lang="en-US"/>
               <a:t>Second level</a:t>
             </a:r>
+            <a:endParaRPr lang="en-US"/>
           </a:p>
           <a:p>
             <a:pPr lvl="2"/>
@@ -1319,6 +1134,7 @@
               <a:rPr lang="en-US"/>
               <a:t>Third level</a:t>
             </a:r>
+            <a:endParaRPr lang="en-US"/>
           </a:p>
           <a:p>
             <a:pPr lvl="3"/>
@@ -1326,6 +1142,7 @@
               <a:rPr lang="en-US"/>
               <a:t>Fourth level</a:t>
             </a:r>
+            <a:endParaRPr lang="en-US"/>
           </a:p>
           <a:p>
             <a:pPr lvl="4"/>
@@ -1339,13 +1156,7 @@
       </p:sp>
       <p:sp>
         <p:nvSpPr>
-          <p:cNvPr id="4" name="Content Placeholder 3">
-            <a:extLst>
-              <a:ext uri="{FF2B5EF4-FFF2-40B4-BE49-F238E27FC236}">
-                <a16:creationId xmlns:a16="http://schemas.microsoft.com/office/drawing/2014/main" id="{8CA556CF-4322-4CC2-A3E3-8E13B8B4D063}"/>
-              </a:ext>
-            </a:extLst>
-          </p:cNvPr>
+          <p:cNvPr id="4" name="Content Placeholder 3"/>
           <p:cNvSpPr>
             <a:spLocks noGrp="1"/>
           </p:cNvSpPr>
@@ -1368,6 +1179,7 @@
               <a:rPr lang="en-US"/>
               <a:t>Edit Master text styles</a:t>
             </a:r>
+            <a:endParaRPr lang="en-US"/>
           </a:p>
           <a:p>
             <a:pPr lvl="1"/>
@@ -1375,6 +1187,7 @@
               <a:rPr lang="en-US"/>
               <a:t>Second level</a:t>
             </a:r>
+            <a:endParaRPr lang="en-US"/>
           </a:p>
           <a:p>
             <a:pPr lvl="2"/>
@@ -1382,6 +1195,7 @@
               <a:rPr lang="en-US"/>
               <a:t>Third level</a:t>
             </a:r>
+            <a:endParaRPr lang="en-US"/>
           </a:p>
           <a:p>
             <a:pPr lvl="3"/>
@@ -1389,6 +1203,7 @@
               <a:rPr lang="en-US"/>
               <a:t>Fourth level</a:t>
             </a:r>
+            <a:endParaRPr lang="en-US"/>
           </a:p>
           <a:p>
             <a:pPr lvl="4"/>
@@ -1402,13 +1217,7 @@
       </p:sp>
       <p:sp>
         <p:nvSpPr>
-          <p:cNvPr id="5" name="Date Placeholder 4">
-            <a:extLst>
-              <a:ext uri="{FF2B5EF4-FFF2-40B4-BE49-F238E27FC236}">
-                <a16:creationId xmlns:a16="http://schemas.microsoft.com/office/drawing/2014/main" id="{A2B5937F-804D-4FB5-87BC-234FA1CFC019}"/>
-              </a:ext>
-            </a:extLst>
-          </p:cNvPr>
+          <p:cNvPr id="5" name="Date Placeholder 4"/>
           <p:cNvSpPr>
             <a:spLocks noGrp="1"/>
           </p:cNvSpPr>
@@ -1423,7 +1232,6 @@
           <a:p>
             <a:fld id="{DEB5C0FF-D3D9-4BDF-BFFB-33E9B8DC3C76}" type="datetimeFigureOut">
               <a:rPr lang="en-SG" smtClean="0"/>
-              <a:t>27/9/2017</a:t>
             </a:fld>
             <a:endParaRPr lang="en-SG"/>
           </a:p>
@@ -1431,13 +1239,7 @@
       </p:sp>
       <p:sp>
         <p:nvSpPr>
-          <p:cNvPr id="6" name="Footer Placeholder 5">
-            <a:extLst>
-              <a:ext uri="{FF2B5EF4-FFF2-40B4-BE49-F238E27FC236}">
-                <a16:creationId xmlns:a16="http://schemas.microsoft.com/office/drawing/2014/main" id="{C06BD681-1BED-41D2-AF30-BD58455E7FA2}"/>
-              </a:ext>
-            </a:extLst>
-          </p:cNvPr>
+          <p:cNvPr id="6" name="Footer Placeholder 5"/>
           <p:cNvSpPr>
             <a:spLocks noGrp="1"/>
           </p:cNvSpPr>
@@ -1456,13 +1258,7 @@
       </p:sp>
       <p:sp>
         <p:nvSpPr>
-          <p:cNvPr id="7" name="Slide Number Placeholder 6">
-            <a:extLst>
-              <a:ext uri="{FF2B5EF4-FFF2-40B4-BE49-F238E27FC236}">
-                <a16:creationId xmlns:a16="http://schemas.microsoft.com/office/drawing/2014/main" id="{987793D8-7ED8-48E0-B038-9764F450C18D}"/>
-              </a:ext>
-            </a:extLst>
-          </p:cNvPr>
+          <p:cNvPr id="7" name="Slide Number Placeholder 6"/>
           <p:cNvSpPr>
             <a:spLocks noGrp="1"/>
           </p:cNvSpPr>
@@ -1477,18 +1273,12 @@
           <a:p>
             <a:fld id="{956F4D74-276B-431A-85B2-E0F4CCEF394D}" type="slidenum">
               <a:rPr lang="en-SG" smtClean="0"/>
-              <a:t>‹#›</a:t>
             </a:fld>
             <a:endParaRPr lang="en-SG"/>
           </a:p>
         </p:txBody>
       </p:sp>
     </p:spTree>
-    <p:extLst>
-      <p:ext uri="{BB962C8B-B14F-4D97-AF65-F5344CB8AC3E}">
-        <p14:creationId xmlns:p14="http://schemas.microsoft.com/office/powerpoint/2010/main" val="273730363"/>
-      </p:ext>
-    </p:extLst>
   </p:cSld>
   <p:clrMapOvr>
     <a:masterClrMapping/>
@@ -1515,13 +1305,7 @@
       </p:grpSpPr>
       <p:sp>
         <p:nvSpPr>
-          <p:cNvPr id="2" name="Title 1">
-            <a:extLst>
-              <a:ext uri="{FF2B5EF4-FFF2-40B4-BE49-F238E27FC236}">
-                <a16:creationId xmlns:a16="http://schemas.microsoft.com/office/drawing/2014/main" id="{723B56C1-38BA-4057-9672-3DBE2FDBD7D2}"/>
-              </a:ext>
-            </a:extLst>
-          </p:cNvPr>
+          <p:cNvPr id="2" name="Title 1"/>
           <p:cNvSpPr>
             <a:spLocks noGrp="1"/>
           </p:cNvSpPr>
@@ -1549,13 +1333,7 @@
       </p:sp>
       <p:sp>
         <p:nvSpPr>
-          <p:cNvPr id="3" name="Text Placeholder 2">
-            <a:extLst>
-              <a:ext uri="{FF2B5EF4-FFF2-40B4-BE49-F238E27FC236}">
-                <a16:creationId xmlns:a16="http://schemas.microsoft.com/office/drawing/2014/main" id="{2EE3A17B-E794-4EFC-8917-4E0EB33F1354}"/>
-              </a:ext>
-            </a:extLst>
-          </p:cNvPr>
+          <p:cNvPr id="3" name="Text Placeholder 2"/>
           <p:cNvSpPr>
             <a:spLocks noGrp="1"/>
           </p:cNvSpPr>
@@ -1615,18 +1393,13 @@
               <a:rPr lang="en-US"/>
               <a:t>Edit Master text styles</a:t>
             </a:r>
-          </a:p>
-        </p:txBody>
-      </p:sp>
-      <p:sp>
-        <p:nvSpPr>
-          <p:cNvPr id="4" name="Content Placeholder 3">
-            <a:extLst>
-              <a:ext uri="{FF2B5EF4-FFF2-40B4-BE49-F238E27FC236}">
-                <a16:creationId xmlns:a16="http://schemas.microsoft.com/office/drawing/2014/main" id="{243125FD-C8E8-49CE-A797-8B7E41060EB9}"/>
-              </a:ext>
-            </a:extLst>
-          </p:cNvPr>
+            <a:endParaRPr lang="en-US"/>
+          </a:p>
+        </p:txBody>
+      </p:sp>
+      <p:sp>
+        <p:nvSpPr>
+          <p:cNvPr id="4" name="Content Placeholder 3"/>
           <p:cNvSpPr>
             <a:spLocks noGrp="1"/>
           </p:cNvSpPr>
@@ -1649,6 +1422,7 @@
               <a:rPr lang="en-US"/>
               <a:t>Edit Master text styles</a:t>
             </a:r>
+            <a:endParaRPr lang="en-US"/>
           </a:p>
           <a:p>
             <a:pPr lvl="1"/>
@@ -1656,6 +1430,7 @@
               <a:rPr lang="en-US"/>
               <a:t>Second level</a:t>
             </a:r>
+            <a:endParaRPr lang="en-US"/>
           </a:p>
           <a:p>
             <a:pPr lvl="2"/>
@@ -1663,6 +1438,7 @@
               <a:rPr lang="en-US"/>
               <a:t>Third level</a:t>
             </a:r>
+            <a:endParaRPr lang="en-US"/>
           </a:p>
           <a:p>
             <a:pPr lvl="3"/>
@@ -1670,6 +1446,7 @@
               <a:rPr lang="en-US"/>
               <a:t>Fourth level</a:t>
             </a:r>
+            <a:endParaRPr lang="en-US"/>
           </a:p>
           <a:p>
             <a:pPr lvl="4"/>
@@ -1683,13 +1460,7 @@
       </p:sp>
       <p:sp>
         <p:nvSpPr>
-          <p:cNvPr id="5" name="Text Placeholder 4">
-            <a:extLst>
-              <a:ext uri="{FF2B5EF4-FFF2-40B4-BE49-F238E27FC236}">
-                <a16:creationId xmlns:a16="http://schemas.microsoft.com/office/drawing/2014/main" id="{2D6DDE63-292C-4FFC-BB64-81A10509E180}"/>
-              </a:ext>
-            </a:extLst>
-          </p:cNvPr>
+          <p:cNvPr id="5" name="Text Placeholder 4"/>
           <p:cNvSpPr>
             <a:spLocks noGrp="1"/>
           </p:cNvSpPr>
@@ -1749,18 +1520,13 @@
               <a:rPr lang="en-US"/>
               <a:t>Edit Master text styles</a:t>
             </a:r>
-          </a:p>
-        </p:txBody>
-      </p:sp>
-      <p:sp>
-        <p:nvSpPr>
-          <p:cNvPr id="6" name="Content Placeholder 5">
-            <a:extLst>
-              <a:ext uri="{FF2B5EF4-FFF2-40B4-BE49-F238E27FC236}">
-                <a16:creationId xmlns:a16="http://schemas.microsoft.com/office/drawing/2014/main" id="{5E346292-CEFA-407B-ADDE-03FBB78A897E}"/>
-              </a:ext>
-            </a:extLst>
-          </p:cNvPr>
+            <a:endParaRPr lang="en-US"/>
+          </a:p>
+        </p:txBody>
+      </p:sp>
+      <p:sp>
+        <p:nvSpPr>
+          <p:cNvPr id="6" name="Content Placeholder 5"/>
           <p:cNvSpPr>
             <a:spLocks noGrp="1"/>
           </p:cNvSpPr>
@@ -1783,6 +1549,7 @@
               <a:rPr lang="en-US"/>
               <a:t>Edit Master text styles</a:t>
             </a:r>
+            <a:endParaRPr lang="en-US"/>
           </a:p>
           <a:p>
             <a:pPr lvl="1"/>
@@ -1790,6 +1557,7 @@
               <a:rPr lang="en-US"/>
               <a:t>Second level</a:t>
             </a:r>
+            <a:endParaRPr lang="en-US"/>
           </a:p>
           <a:p>
             <a:pPr lvl="2"/>
@@ -1797,6 +1565,7 @@
               <a:rPr lang="en-US"/>
               <a:t>Third level</a:t>
             </a:r>
+            <a:endParaRPr lang="en-US"/>
           </a:p>
           <a:p>
             <a:pPr lvl="3"/>
@@ -1804,6 +1573,7 @@
               <a:rPr lang="en-US"/>
               <a:t>Fourth level</a:t>
             </a:r>
+            <a:endParaRPr lang="en-US"/>
           </a:p>
           <a:p>
             <a:pPr lvl="4"/>
@@ -1817,13 +1587,7 @@
       </p:sp>
       <p:sp>
         <p:nvSpPr>
-          <p:cNvPr id="7" name="Date Placeholder 6">
-            <a:extLst>
-              <a:ext uri="{FF2B5EF4-FFF2-40B4-BE49-F238E27FC236}">
-                <a16:creationId xmlns:a16="http://schemas.microsoft.com/office/drawing/2014/main" id="{BBD822A0-61C1-4648-9107-44028A6F67F3}"/>
-              </a:ext>
-            </a:extLst>
-          </p:cNvPr>
+          <p:cNvPr id="7" name="Date Placeholder 6"/>
           <p:cNvSpPr>
             <a:spLocks noGrp="1"/>
           </p:cNvSpPr>
@@ -1838,7 +1602,6 @@
           <a:p>
             <a:fld id="{DEB5C0FF-D3D9-4BDF-BFFB-33E9B8DC3C76}" type="datetimeFigureOut">
               <a:rPr lang="en-SG" smtClean="0"/>
-              <a:t>27/9/2017</a:t>
             </a:fld>
             <a:endParaRPr lang="en-SG"/>
           </a:p>
@@ -1846,13 +1609,7 @@
       </p:sp>
       <p:sp>
         <p:nvSpPr>
-          <p:cNvPr id="8" name="Footer Placeholder 7">
-            <a:extLst>
-              <a:ext uri="{FF2B5EF4-FFF2-40B4-BE49-F238E27FC236}">
-                <a16:creationId xmlns:a16="http://schemas.microsoft.com/office/drawing/2014/main" id="{9F61AB10-B607-4211-AD13-489F72024EAD}"/>
-              </a:ext>
-            </a:extLst>
-          </p:cNvPr>
+          <p:cNvPr id="8" name="Footer Placeholder 7"/>
           <p:cNvSpPr>
             <a:spLocks noGrp="1"/>
           </p:cNvSpPr>
@@ -1871,13 +1628,7 @@
       </p:sp>
       <p:sp>
         <p:nvSpPr>
-          <p:cNvPr id="9" name="Slide Number Placeholder 8">
-            <a:extLst>
-              <a:ext uri="{FF2B5EF4-FFF2-40B4-BE49-F238E27FC236}">
-                <a16:creationId xmlns:a16="http://schemas.microsoft.com/office/drawing/2014/main" id="{68EC7870-C299-4BD0-9031-CC7D31863D25}"/>
-              </a:ext>
-            </a:extLst>
-          </p:cNvPr>
+          <p:cNvPr id="9" name="Slide Number Placeholder 8"/>
           <p:cNvSpPr>
             <a:spLocks noGrp="1"/>
           </p:cNvSpPr>
@@ -1892,18 +1643,12 @@
           <a:p>
             <a:fld id="{956F4D74-276B-431A-85B2-E0F4CCEF394D}" type="slidenum">
               <a:rPr lang="en-SG" smtClean="0"/>
-              <a:t>‹#›</a:t>
             </a:fld>
             <a:endParaRPr lang="en-SG"/>
           </a:p>
         </p:txBody>
       </p:sp>
     </p:spTree>
-    <p:extLst>
-      <p:ext uri="{BB962C8B-B14F-4D97-AF65-F5344CB8AC3E}">
-        <p14:creationId xmlns:p14="http://schemas.microsoft.com/office/powerpoint/2010/main" val="4022952541"/>
-      </p:ext>
-    </p:extLst>
   </p:cSld>
   <p:clrMapOvr>
     <a:masterClrMapping/>
@@ -1930,13 +1675,7 @@
       </p:grpSpPr>
       <p:sp>
         <p:nvSpPr>
-          <p:cNvPr id="2" name="Title 1">
-            <a:extLst>
-              <a:ext uri="{FF2B5EF4-FFF2-40B4-BE49-F238E27FC236}">
-                <a16:creationId xmlns:a16="http://schemas.microsoft.com/office/drawing/2014/main" id="{434FA13E-BC91-46B7-B559-16F13F206747}"/>
-              </a:ext>
-            </a:extLst>
-          </p:cNvPr>
+          <p:cNvPr id="2" name="Title 1"/>
           <p:cNvSpPr>
             <a:spLocks noGrp="1"/>
           </p:cNvSpPr>
@@ -1959,13 +1698,7 @@
       </p:sp>
       <p:sp>
         <p:nvSpPr>
-          <p:cNvPr id="3" name="Date Placeholder 2">
-            <a:extLst>
-              <a:ext uri="{FF2B5EF4-FFF2-40B4-BE49-F238E27FC236}">
-                <a16:creationId xmlns:a16="http://schemas.microsoft.com/office/drawing/2014/main" id="{DF8FA80B-A166-4BE3-920D-4F71A00E3941}"/>
-              </a:ext>
-            </a:extLst>
-          </p:cNvPr>
+          <p:cNvPr id="3" name="Date Placeholder 2"/>
           <p:cNvSpPr>
             <a:spLocks noGrp="1"/>
           </p:cNvSpPr>
@@ -1980,7 +1713,6 @@
           <a:p>
             <a:fld id="{DEB5C0FF-D3D9-4BDF-BFFB-33E9B8DC3C76}" type="datetimeFigureOut">
               <a:rPr lang="en-SG" smtClean="0"/>
-              <a:t>27/9/2017</a:t>
             </a:fld>
             <a:endParaRPr lang="en-SG"/>
           </a:p>
@@ -1988,13 +1720,7 @@
       </p:sp>
       <p:sp>
         <p:nvSpPr>
-          <p:cNvPr id="4" name="Footer Placeholder 3">
-            <a:extLst>
-              <a:ext uri="{FF2B5EF4-FFF2-40B4-BE49-F238E27FC236}">
-                <a16:creationId xmlns:a16="http://schemas.microsoft.com/office/drawing/2014/main" id="{35F45C8C-669C-4EAB-936B-069BA376CA52}"/>
-              </a:ext>
-            </a:extLst>
-          </p:cNvPr>
+          <p:cNvPr id="4" name="Footer Placeholder 3"/>
           <p:cNvSpPr>
             <a:spLocks noGrp="1"/>
           </p:cNvSpPr>
@@ -2013,13 +1739,7 @@
       </p:sp>
       <p:sp>
         <p:nvSpPr>
-          <p:cNvPr id="5" name="Slide Number Placeholder 4">
-            <a:extLst>
-              <a:ext uri="{FF2B5EF4-FFF2-40B4-BE49-F238E27FC236}">
-                <a16:creationId xmlns:a16="http://schemas.microsoft.com/office/drawing/2014/main" id="{EE74289C-7C04-447B-9C6B-3E7F2AC60F4B}"/>
-              </a:ext>
-            </a:extLst>
-          </p:cNvPr>
+          <p:cNvPr id="5" name="Slide Number Placeholder 4"/>
           <p:cNvSpPr>
             <a:spLocks noGrp="1"/>
           </p:cNvSpPr>
@@ -2034,18 +1754,12 @@
           <a:p>
             <a:fld id="{956F4D74-276B-431A-85B2-E0F4CCEF394D}" type="slidenum">
               <a:rPr lang="en-SG" smtClean="0"/>
-              <a:t>‹#›</a:t>
             </a:fld>
             <a:endParaRPr lang="en-SG"/>
           </a:p>
         </p:txBody>
       </p:sp>
     </p:spTree>
-    <p:extLst>
-      <p:ext uri="{BB962C8B-B14F-4D97-AF65-F5344CB8AC3E}">
-        <p14:creationId xmlns:p14="http://schemas.microsoft.com/office/powerpoint/2010/main" val="1918571080"/>
-      </p:ext>
-    </p:extLst>
   </p:cSld>
   <p:clrMapOvr>
     <a:masterClrMapping/>
@@ -2072,13 +1786,7 @@
       </p:grpSpPr>
       <p:sp>
         <p:nvSpPr>
-          <p:cNvPr id="2" name="Date Placeholder 1">
-            <a:extLst>
-              <a:ext uri="{FF2B5EF4-FFF2-40B4-BE49-F238E27FC236}">
-                <a16:creationId xmlns:a16="http://schemas.microsoft.com/office/drawing/2014/main" id="{7878EDB3-727C-4FB0-8AB2-244BBEB2851C}"/>
-              </a:ext>
-            </a:extLst>
-          </p:cNvPr>
+          <p:cNvPr id="2" name="Date Placeholder 1"/>
           <p:cNvSpPr>
             <a:spLocks noGrp="1"/>
           </p:cNvSpPr>
@@ -2093,7 +1801,6 @@
           <a:p>
             <a:fld id="{DEB5C0FF-D3D9-4BDF-BFFB-33E9B8DC3C76}" type="datetimeFigureOut">
               <a:rPr lang="en-SG" smtClean="0"/>
-              <a:t>27/9/2017</a:t>
             </a:fld>
             <a:endParaRPr lang="en-SG"/>
           </a:p>
@@ -2101,13 +1808,7 @@
       </p:sp>
       <p:sp>
         <p:nvSpPr>
-          <p:cNvPr id="3" name="Footer Placeholder 2">
-            <a:extLst>
-              <a:ext uri="{FF2B5EF4-FFF2-40B4-BE49-F238E27FC236}">
-                <a16:creationId xmlns:a16="http://schemas.microsoft.com/office/drawing/2014/main" id="{E724650B-825C-4CC1-9AB0-669124837F1C}"/>
-              </a:ext>
-            </a:extLst>
-          </p:cNvPr>
+          <p:cNvPr id="3" name="Footer Placeholder 2"/>
           <p:cNvSpPr>
             <a:spLocks noGrp="1"/>
           </p:cNvSpPr>
@@ -2126,13 +1827,7 @@
       </p:sp>
       <p:sp>
         <p:nvSpPr>
-          <p:cNvPr id="4" name="Slide Number Placeholder 3">
-            <a:extLst>
-              <a:ext uri="{FF2B5EF4-FFF2-40B4-BE49-F238E27FC236}">
-                <a16:creationId xmlns:a16="http://schemas.microsoft.com/office/drawing/2014/main" id="{432FC699-76E3-4347-AD43-8D52B70D5EA3}"/>
-              </a:ext>
-            </a:extLst>
-          </p:cNvPr>
+          <p:cNvPr id="4" name="Slide Number Placeholder 3"/>
           <p:cNvSpPr>
             <a:spLocks noGrp="1"/>
           </p:cNvSpPr>
@@ -2147,18 +1842,12 @@
           <a:p>
             <a:fld id="{956F4D74-276B-431A-85B2-E0F4CCEF394D}" type="slidenum">
               <a:rPr lang="en-SG" smtClean="0"/>
-              <a:t>‹#›</a:t>
             </a:fld>
             <a:endParaRPr lang="en-SG"/>
           </a:p>
         </p:txBody>
       </p:sp>
     </p:spTree>
-    <p:extLst>
-      <p:ext uri="{BB962C8B-B14F-4D97-AF65-F5344CB8AC3E}">
-        <p14:creationId xmlns:p14="http://schemas.microsoft.com/office/powerpoint/2010/main" val="3258522474"/>
-      </p:ext>
-    </p:extLst>
   </p:cSld>
   <p:clrMapOvr>
     <a:masterClrMapping/>
@@ -2185,13 +1874,7 @@
       </p:grpSpPr>
       <p:sp>
         <p:nvSpPr>
-          <p:cNvPr id="2" name="Title 1">
-            <a:extLst>
-              <a:ext uri="{FF2B5EF4-FFF2-40B4-BE49-F238E27FC236}">
-                <a16:creationId xmlns:a16="http://schemas.microsoft.com/office/drawing/2014/main" id="{3A1E895A-5601-4B8C-BED9-58EB0B37A858}"/>
-              </a:ext>
-            </a:extLst>
-          </p:cNvPr>
+          <p:cNvPr id="2" name="Title 1"/>
           <p:cNvSpPr>
             <a:spLocks noGrp="1"/>
           </p:cNvSpPr>
@@ -2223,13 +1906,7 @@
       </p:sp>
       <p:sp>
         <p:nvSpPr>
-          <p:cNvPr id="3" name="Content Placeholder 2">
-            <a:extLst>
-              <a:ext uri="{FF2B5EF4-FFF2-40B4-BE49-F238E27FC236}">
-                <a16:creationId xmlns:a16="http://schemas.microsoft.com/office/drawing/2014/main" id="{A114A533-EF9E-419E-B630-CE286F2269B4}"/>
-              </a:ext>
-            </a:extLst>
-          </p:cNvPr>
+          <p:cNvPr id="3" name="Content Placeholder 2"/>
           <p:cNvSpPr>
             <a:spLocks noGrp="1"/>
           </p:cNvSpPr>
@@ -2280,6 +1957,7 @@
               <a:rPr lang="en-US"/>
               <a:t>Edit Master text styles</a:t>
             </a:r>
+            <a:endParaRPr lang="en-US"/>
           </a:p>
           <a:p>
             <a:pPr lvl="1"/>
@@ -2287,6 +1965,7 @@
               <a:rPr lang="en-US"/>
               <a:t>Second level</a:t>
             </a:r>
+            <a:endParaRPr lang="en-US"/>
           </a:p>
           <a:p>
             <a:pPr lvl="2"/>
@@ -2294,6 +1973,7 @@
               <a:rPr lang="en-US"/>
               <a:t>Third level</a:t>
             </a:r>
+            <a:endParaRPr lang="en-US"/>
           </a:p>
           <a:p>
             <a:pPr lvl="3"/>
@@ -2301,6 +1981,7 @@
               <a:rPr lang="en-US"/>
               <a:t>Fourth level</a:t>
             </a:r>
+            <a:endParaRPr lang="en-US"/>
           </a:p>
           <a:p>
             <a:pPr lvl="4"/>
@@ -2314,13 +1995,7 @@
       </p:sp>
       <p:sp>
         <p:nvSpPr>
-          <p:cNvPr id="4" name="Text Placeholder 3">
-            <a:extLst>
-              <a:ext uri="{FF2B5EF4-FFF2-40B4-BE49-F238E27FC236}">
-                <a16:creationId xmlns:a16="http://schemas.microsoft.com/office/drawing/2014/main" id="{5C922E60-2CBE-499A-A1A0-25A44C98EF7E}"/>
-              </a:ext>
-            </a:extLst>
-          </p:cNvPr>
+          <p:cNvPr id="4" name="Text Placeholder 3"/>
           <p:cNvSpPr>
             <a:spLocks noGrp="1"/>
           </p:cNvSpPr>
@@ -2380,18 +2055,13 @@
               <a:rPr lang="en-US"/>
               <a:t>Edit Master text styles</a:t>
             </a:r>
-          </a:p>
-        </p:txBody>
-      </p:sp>
-      <p:sp>
-        <p:nvSpPr>
-          <p:cNvPr id="5" name="Date Placeholder 4">
-            <a:extLst>
-              <a:ext uri="{FF2B5EF4-FFF2-40B4-BE49-F238E27FC236}">
-                <a16:creationId xmlns:a16="http://schemas.microsoft.com/office/drawing/2014/main" id="{896DDADF-346A-4EC8-A5D4-FF8160F3A7B2}"/>
-              </a:ext>
-            </a:extLst>
-          </p:cNvPr>
+            <a:endParaRPr lang="en-US"/>
+          </a:p>
+        </p:txBody>
+      </p:sp>
+      <p:sp>
+        <p:nvSpPr>
+          <p:cNvPr id="5" name="Date Placeholder 4"/>
           <p:cNvSpPr>
             <a:spLocks noGrp="1"/>
           </p:cNvSpPr>
@@ -2406,7 +2076,6 @@
           <a:p>
             <a:fld id="{DEB5C0FF-D3D9-4BDF-BFFB-33E9B8DC3C76}" type="datetimeFigureOut">
               <a:rPr lang="en-SG" smtClean="0"/>
-              <a:t>27/9/2017</a:t>
             </a:fld>
             <a:endParaRPr lang="en-SG"/>
           </a:p>
@@ -2414,13 +2083,7 @@
       </p:sp>
       <p:sp>
         <p:nvSpPr>
-          <p:cNvPr id="6" name="Footer Placeholder 5">
-            <a:extLst>
-              <a:ext uri="{FF2B5EF4-FFF2-40B4-BE49-F238E27FC236}">
-                <a16:creationId xmlns:a16="http://schemas.microsoft.com/office/drawing/2014/main" id="{92E97B35-18DF-4CDA-92BC-834199B59689}"/>
-              </a:ext>
-            </a:extLst>
-          </p:cNvPr>
+          <p:cNvPr id="6" name="Footer Placeholder 5"/>
           <p:cNvSpPr>
             <a:spLocks noGrp="1"/>
           </p:cNvSpPr>
@@ -2439,13 +2102,7 @@
       </p:sp>
       <p:sp>
         <p:nvSpPr>
-          <p:cNvPr id="7" name="Slide Number Placeholder 6">
-            <a:extLst>
-              <a:ext uri="{FF2B5EF4-FFF2-40B4-BE49-F238E27FC236}">
-                <a16:creationId xmlns:a16="http://schemas.microsoft.com/office/drawing/2014/main" id="{E60A183E-C5F1-4827-A708-5BF9EDEB9BC0}"/>
-              </a:ext>
-            </a:extLst>
-          </p:cNvPr>
+          <p:cNvPr id="7" name="Slide Number Placeholder 6"/>
           <p:cNvSpPr>
             <a:spLocks noGrp="1"/>
           </p:cNvSpPr>
@@ -2460,18 +2117,12 @@
           <a:p>
             <a:fld id="{956F4D74-276B-431A-85B2-E0F4CCEF394D}" type="slidenum">
               <a:rPr lang="en-SG" smtClean="0"/>
-              <a:t>‹#›</a:t>
             </a:fld>
             <a:endParaRPr lang="en-SG"/>
           </a:p>
         </p:txBody>
       </p:sp>
     </p:spTree>
-    <p:extLst>
-      <p:ext uri="{BB962C8B-B14F-4D97-AF65-F5344CB8AC3E}">
-        <p14:creationId xmlns:p14="http://schemas.microsoft.com/office/powerpoint/2010/main" val="3176997859"/>
-      </p:ext>
-    </p:extLst>
   </p:cSld>
   <p:clrMapOvr>
     <a:masterClrMapping/>
@@ -2498,13 +2149,7 @@
       </p:grpSpPr>
       <p:sp>
         <p:nvSpPr>
-          <p:cNvPr id="2" name="Title 1">
-            <a:extLst>
-              <a:ext uri="{FF2B5EF4-FFF2-40B4-BE49-F238E27FC236}">
-                <a16:creationId xmlns:a16="http://schemas.microsoft.com/office/drawing/2014/main" id="{B4EFEC7E-1DC8-47D6-A4B2-79047FECAE5C}"/>
-              </a:ext>
-            </a:extLst>
-          </p:cNvPr>
+          <p:cNvPr id="2" name="Title 1"/>
           <p:cNvSpPr>
             <a:spLocks noGrp="1"/>
           </p:cNvSpPr>
@@ -2536,13 +2181,7 @@
       </p:sp>
       <p:sp>
         <p:nvSpPr>
-          <p:cNvPr id="3" name="Picture Placeholder 2">
-            <a:extLst>
-              <a:ext uri="{FF2B5EF4-FFF2-40B4-BE49-F238E27FC236}">
-                <a16:creationId xmlns:a16="http://schemas.microsoft.com/office/drawing/2014/main" id="{40B570B2-AD8B-442C-9807-767F8250896F}"/>
-              </a:ext>
-            </a:extLst>
-          </p:cNvPr>
+          <p:cNvPr id="3" name="Picture Placeholder 2"/>
           <p:cNvSpPr>
             <a:spLocks noGrp="1"/>
           </p:cNvSpPr>
@@ -2603,13 +2242,7 @@
       </p:sp>
       <p:sp>
         <p:nvSpPr>
-          <p:cNvPr id="4" name="Text Placeholder 3">
-            <a:extLst>
-              <a:ext uri="{FF2B5EF4-FFF2-40B4-BE49-F238E27FC236}">
-                <a16:creationId xmlns:a16="http://schemas.microsoft.com/office/drawing/2014/main" id="{22295FB5-3AFE-4022-BBA1-D8764608DB11}"/>
-              </a:ext>
-            </a:extLst>
-          </p:cNvPr>
+          <p:cNvPr id="4" name="Text Placeholder 3"/>
           <p:cNvSpPr>
             <a:spLocks noGrp="1"/>
           </p:cNvSpPr>
@@ -2669,18 +2302,13 @@
               <a:rPr lang="en-US"/>
               <a:t>Edit Master text styles</a:t>
             </a:r>
-          </a:p>
-        </p:txBody>
-      </p:sp>
-      <p:sp>
-        <p:nvSpPr>
-          <p:cNvPr id="5" name="Date Placeholder 4">
-            <a:extLst>
-              <a:ext uri="{FF2B5EF4-FFF2-40B4-BE49-F238E27FC236}">
-                <a16:creationId xmlns:a16="http://schemas.microsoft.com/office/drawing/2014/main" id="{4EDE0F0F-983C-4FA0-956A-557D2FA950D8}"/>
-              </a:ext>
-            </a:extLst>
-          </p:cNvPr>
+            <a:endParaRPr lang="en-US"/>
+          </a:p>
+        </p:txBody>
+      </p:sp>
+      <p:sp>
+        <p:nvSpPr>
+          <p:cNvPr id="5" name="Date Placeholder 4"/>
           <p:cNvSpPr>
             <a:spLocks noGrp="1"/>
           </p:cNvSpPr>
@@ -2695,7 +2323,6 @@
           <a:p>
             <a:fld id="{DEB5C0FF-D3D9-4BDF-BFFB-33E9B8DC3C76}" type="datetimeFigureOut">
               <a:rPr lang="en-SG" smtClean="0"/>
-              <a:t>27/9/2017</a:t>
             </a:fld>
             <a:endParaRPr lang="en-SG"/>
           </a:p>
@@ -2703,13 +2330,7 @@
       </p:sp>
       <p:sp>
         <p:nvSpPr>
-          <p:cNvPr id="6" name="Footer Placeholder 5">
-            <a:extLst>
-              <a:ext uri="{FF2B5EF4-FFF2-40B4-BE49-F238E27FC236}">
-                <a16:creationId xmlns:a16="http://schemas.microsoft.com/office/drawing/2014/main" id="{E78AB00A-83AB-4B97-B21B-3ABAB841BE84}"/>
-              </a:ext>
-            </a:extLst>
-          </p:cNvPr>
+          <p:cNvPr id="6" name="Footer Placeholder 5"/>
           <p:cNvSpPr>
             <a:spLocks noGrp="1"/>
           </p:cNvSpPr>
@@ -2728,13 +2349,7 @@
       </p:sp>
       <p:sp>
         <p:nvSpPr>
-          <p:cNvPr id="7" name="Slide Number Placeholder 6">
-            <a:extLst>
-              <a:ext uri="{FF2B5EF4-FFF2-40B4-BE49-F238E27FC236}">
-                <a16:creationId xmlns:a16="http://schemas.microsoft.com/office/drawing/2014/main" id="{02DFB414-3172-4F15-BDC5-AA701569AE2D}"/>
-              </a:ext>
-            </a:extLst>
-          </p:cNvPr>
+          <p:cNvPr id="7" name="Slide Number Placeholder 6"/>
           <p:cNvSpPr>
             <a:spLocks noGrp="1"/>
           </p:cNvSpPr>
@@ -2749,18 +2364,12 @@
           <a:p>
             <a:fld id="{956F4D74-276B-431A-85B2-E0F4CCEF394D}" type="slidenum">
               <a:rPr lang="en-SG" smtClean="0"/>
-              <a:t>‹#›</a:t>
             </a:fld>
             <a:endParaRPr lang="en-SG"/>
           </a:p>
         </p:txBody>
       </p:sp>
     </p:spTree>
-    <p:extLst>
-      <p:ext uri="{BB962C8B-B14F-4D97-AF65-F5344CB8AC3E}">
-        <p14:creationId xmlns:p14="http://schemas.microsoft.com/office/powerpoint/2010/main" val="1826114783"/>
-      </p:ext>
-    </p:extLst>
   </p:cSld>
   <p:clrMapOvr>
     <a:masterClrMapping/>
@@ -2792,13 +2401,7 @@
       </p:grpSpPr>
       <p:sp>
         <p:nvSpPr>
-          <p:cNvPr id="2" name="Title Placeholder 1">
-            <a:extLst>
-              <a:ext uri="{FF2B5EF4-FFF2-40B4-BE49-F238E27FC236}">
-                <a16:creationId xmlns:a16="http://schemas.microsoft.com/office/drawing/2014/main" id="{5277F529-01DF-4CA8-B65B-B61169047B67}"/>
-              </a:ext>
-            </a:extLst>
-          </p:cNvPr>
+          <p:cNvPr id="2" name="Title Placeholder 1"/>
           <p:cNvSpPr>
             <a:spLocks noGrp="1"/>
           </p:cNvSpPr>
@@ -2831,13 +2434,7 @@
       </p:sp>
       <p:sp>
         <p:nvSpPr>
-          <p:cNvPr id="3" name="Text Placeholder 2">
-            <a:extLst>
-              <a:ext uri="{FF2B5EF4-FFF2-40B4-BE49-F238E27FC236}">
-                <a16:creationId xmlns:a16="http://schemas.microsoft.com/office/drawing/2014/main" id="{C99F9FCB-628C-442E-B906-3422C929E987}"/>
-              </a:ext>
-            </a:extLst>
-          </p:cNvPr>
+          <p:cNvPr id="3" name="Text Placeholder 2"/>
           <p:cNvSpPr>
             <a:spLocks noGrp="1"/>
           </p:cNvSpPr>
@@ -2865,6 +2462,7 @@
               <a:rPr lang="en-US"/>
               <a:t>Edit Master text styles</a:t>
             </a:r>
+            <a:endParaRPr lang="en-US"/>
           </a:p>
           <a:p>
             <a:pPr lvl="1"/>
@@ -2872,6 +2470,7 @@
               <a:rPr lang="en-US"/>
               <a:t>Second level</a:t>
             </a:r>
+            <a:endParaRPr lang="en-US"/>
           </a:p>
           <a:p>
             <a:pPr lvl="2"/>
@@ -2879,6 +2478,7 @@
               <a:rPr lang="en-US"/>
               <a:t>Third level</a:t>
             </a:r>
+            <a:endParaRPr lang="en-US"/>
           </a:p>
           <a:p>
             <a:pPr lvl="3"/>
@@ -2886,6 +2486,7 @@
               <a:rPr lang="en-US"/>
               <a:t>Fourth level</a:t>
             </a:r>
+            <a:endParaRPr lang="en-US"/>
           </a:p>
           <a:p>
             <a:pPr lvl="4"/>
@@ -2899,13 +2500,7 @@
       </p:sp>
       <p:sp>
         <p:nvSpPr>
-          <p:cNvPr id="4" name="Date Placeholder 3">
-            <a:extLst>
-              <a:ext uri="{FF2B5EF4-FFF2-40B4-BE49-F238E27FC236}">
-                <a16:creationId xmlns:a16="http://schemas.microsoft.com/office/drawing/2014/main" id="{47697004-8D55-4E28-AA52-AADF5DDFDEC1}"/>
-              </a:ext>
-            </a:extLst>
-          </p:cNvPr>
+          <p:cNvPr id="4" name="Date Placeholder 3"/>
           <p:cNvSpPr>
             <a:spLocks noGrp="1"/>
           </p:cNvSpPr>
@@ -2938,7 +2533,6 @@
           <a:p>
             <a:fld id="{DEB5C0FF-D3D9-4BDF-BFFB-33E9B8DC3C76}" type="datetimeFigureOut">
               <a:rPr lang="en-SG" smtClean="0"/>
-              <a:t>27/9/2017</a:t>
             </a:fld>
             <a:endParaRPr lang="en-SG"/>
           </a:p>
@@ -2946,13 +2540,7 @@
       </p:sp>
       <p:sp>
         <p:nvSpPr>
-          <p:cNvPr id="5" name="Footer Placeholder 4">
-            <a:extLst>
-              <a:ext uri="{FF2B5EF4-FFF2-40B4-BE49-F238E27FC236}">
-                <a16:creationId xmlns:a16="http://schemas.microsoft.com/office/drawing/2014/main" id="{5AFA521B-F1D2-4A60-A90B-449FDD3FEF09}"/>
-              </a:ext>
-            </a:extLst>
-          </p:cNvPr>
+          <p:cNvPr id="5" name="Footer Placeholder 4"/>
           <p:cNvSpPr>
             <a:spLocks noGrp="1"/>
           </p:cNvSpPr>
@@ -2989,13 +2577,7 @@
       </p:sp>
       <p:sp>
         <p:nvSpPr>
-          <p:cNvPr id="6" name="Slide Number Placeholder 5">
-            <a:extLst>
-              <a:ext uri="{FF2B5EF4-FFF2-40B4-BE49-F238E27FC236}">
-                <a16:creationId xmlns:a16="http://schemas.microsoft.com/office/drawing/2014/main" id="{75B60D02-B9FE-4D82-A914-045F2BFE3C2C}"/>
-              </a:ext>
-            </a:extLst>
-          </p:cNvPr>
+          <p:cNvPr id="6" name="Slide Number Placeholder 5"/>
           <p:cNvSpPr>
             <a:spLocks noGrp="1"/>
           </p:cNvSpPr>
@@ -3028,32 +2610,26 @@
           <a:p>
             <a:fld id="{956F4D74-276B-431A-85B2-E0F4CCEF394D}" type="slidenum">
               <a:rPr lang="en-SG" smtClean="0"/>
-              <a:t>‹#›</a:t>
             </a:fld>
             <a:endParaRPr lang="en-SG"/>
           </a:p>
         </p:txBody>
       </p:sp>
     </p:spTree>
-    <p:extLst>
-      <p:ext uri="{BB962C8B-B14F-4D97-AF65-F5344CB8AC3E}">
-        <p14:creationId xmlns:p14="http://schemas.microsoft.com/office/powerpoint/2010/main" val="4154124194"/>
-      </p:ext>
-    </p:extLst>
   </p:cSld>
   <p:clrMap bg1="lt1" tx1="dk1" bg2="lt2" tx2="dk2" accent1="accent1" accent2="accent2" accent3="accent3" accent4="accent4" accent5="accent5" accent6="accent6" hlink="hlink" folHlink="folHlink"/>
   <p:sldLayoutIdLst>
-    <p:sldLayoutId id="2147483690" r:id="rId1"/>
-    <p:sldLayoutId id="2147483691" r:id="rId2"/>
-    <p:sldLayoutId id="2147483692" r:id="rId3"/>
-    <p:sldLayoutId id="2147483693" r:id="rId4"/>
-    <p:sldLayoutId id="2147483694" r:id="rId5"/>
-    <p:sldLayoutId id="2147483695" r:id="rId6"/>
-    <p:sldLayoutId id="2147483696" r:id="rId7"/>
-    <p:sldLayoutId id="2147483697" r:id="rId8"/>
-    <p:sldLayoutId id="2147483698" r:id="rId9"/>
-    <p:sldLayoutId id="2147483699" r:id="rId10"/>
-    <p:sldLayoutId id="2147483700" r:id="rId11"/>
+    <p:sldLayoutId id="2147483649" r:id="rId1"/>
+    <p:sldLayoutId id="2147483650" r:id="rId2"/>
+    <p:sldLayoutId id="2147483651" r:id="rId3"/>
+    <p:sldLayoutId id="2147483652" r:id="rId4"/>
+    <p:sldLayoutId id="2147483653" r:id="rId5"/>
+    <p:sldLayoutId id="2147483654" r:id="rId6"/>
+    <p:sldLayoutId id="2147483655" r:id="rId7"/>
+    <p:sldLayoutId id="2147483656" r:id="rId8"/>
+    <p:sldLayoutId id="2147483657" r:id="rId9"/>
+    <p:sldLayoutId id="2147483658" r:id="rId10"/>
+    <p:sldLayoutId id="2147483659" r:id="rId11"/>
   </p:sldLayoutIdLst>
   <p:txStyles>
     <p:titleStyle>
@@ -3357,13 +2933,7 @@
       </p:grpSpPr>
       <p:sp>
         <p:nvSpPr>
-          <p:cNvPr id="2" name="Title 1">
-            <a:extLst>
-              <a:ext uri="{FF2B5EF4-FFF2-40B4-BE49-F238E27FC236}">
-                <a16:creationId xmlns:a16="http://schemas.microsoft.com/office/drawing/2014/main" id="{6155E3D8-E9BB-4DE5-85CC-F6FF394EA083}"/>
-              </a:ext>
-            </a:extLst>
-          </p:cNvPr>
+          <p:cNvPr id="2" name="Title 1"/>
           <p:cNvSpPr>
             <a:spLocks noGrp="1"/>
           </p:cNvSpPr>
@@ -3386,13 +2956,7 @@
       </p:sp>
       <p:sp>
         <p:nvSpPr>
-          <p:cNvPr id="3" name="Subtitle 2">
-            <a:extLst>
-              <a:ext uri="{FF2B5EF4-FFF2-40B4-BE49-F238E27FC236}">
-                <a16:creationId xmlns:a16="http://schemas.microsoft.com/office/drawing/2014/main" id="{38BEBA4F-840C-4AE1-A2C7-AAFC5ADEA208}"/>
-              </a:ext>
-            </a:extLst>
-          </p:cNvPr>
+          <p:cNvPr id="3" name="Subtitle 2"/>
           <p:cNvSpPr>
             <a:spLocks noGrp="1"/>
           </p:cNvSpPr>
@@ -3410,11 +2974,6 @@
         </p:txBody>
       </p:sp>
     </p:spTree>
-    <p:extLst>
-      <p:ext uri="{BB962C8B-B14F-4D97-AF65-F5344CB8AC3E}">
-        <p14:creationId xmlns:p14="http://schemas.microsoft.com/office/powerpoint/2010/main" val="2702835050"/>
-      </p:ext>
-    </p:extLst>
   </p:cSld>
   <p:clrMapOvr>
     <a:masterClrMapping/>
@@ -3441,13 +3000,74 @@
       </p:grpSpPr>
       <p:sp>
         <p:nvSpPr>
-          <p:cNvPr id="2" name="Title 1">
-            <a:extLst>
-              <a:ext uri="{FF2B5EF4-FFF2-40B4-BE49-F238E27FC236}">
-                <a16:creationId xmlns:a16="http://schemas.microsoft.com/office/drawing/2014/main" id="{E734DDED-2EB1-4227-AE0B-71CA10C5F64B}"/>
-              </a:ext>
-            </a:extLst>
-          </p:cNvPr>
+          <p:cNvPr id="2" name="Title 1"/>
+          <p:cNvSpPr>
+            <a:spLocks noGrp="1"/>
+          </p:cNvSpPr>
+          <p:nvPr>
+            <p:ph type="title"/>
+          </p:nvPr>
+        </p:nvSpPr>
+        <p:spPr/>
+        <p:txBody>
+          <a:bodyPr/>
+          <a:lstStyle/>
+          <a:p>
+            <a:r>
+              <a:rPr lang="en-SG" dirty="0"/>
+              <a:t>Zeta</a:t>
+            </a:r>
+            <a:endParaRPr lang="en-SG" dirty="0"/>
+          </a:p>
+        </p:txBody>
+      </p:sp>
+      <p:sp>
+        <p:nvSpPr>
+          <p:cNvPr id="3" name="Content Placeholder 2"/>
+          <p:cNvSpPr>
+            <a:spLocks noGrp="1"/>
+          </p:cNvSpPr>
+          <p:nvPr>
+            <p:ph idx="1"/>
+          </p:nvPr>
+        </p:nvSpPr>
+        <p:spPr/>
+        <p:txBody>
+          <a:bodyPr/>
+          <a:lstStyle/>
+          <a:p>
+            <a:endParaRPr lang="en-SG"/>
+          </a:p>
+        </p:txBody>
+      </p:sp>
+    </p:spTree>
+  </p:cSld>
+  <p:clrMapOvr>
+    <a:masterClrMapping/>
+  </p:clrMapOvr>
+</p:sld>
+</file>
+
+<file path=ppt/slides/slide11.xml><?xml version="1.0" encoding="utf-8"?>
+<p:sld xmlns:a="http://schemas.openxmlformats.org/drawingml/2006/main" xmlns:r="http://schemas.openxmlformats.org/officeDocument/2006/relationships" xmlns:p="http://schemas.openxmlformats.org/presentationml/2006/main">
+  <p:cSld>
+    <p:spTree>
+      <p:nvGrpSpPr>
+        <p:cNvPr id="1" name=""/>
+        <p:cNvGrpSpPr/>
+        <p:nvPr/>
+      </p:nvGrpSpPr>
+      <p:grpSpPr>
+        <a:xfrm>
+          <a:off x="0" y="0"/>
+          <a:ext cx="0" cy="0"/>
+          <a:chOff x="0" y="0"/>
+          <a:chExt cx="0" cy="0"/>
+        </a:xfrm>
+      </p:grpSpPr>
+      <p:sp>
+        <p:nvSpPr>
+          <p:cNvPr id="2" name="Title 1"/>
           <p:cNvSpPr>
             <a:spLocks noGrp="1"/>
           </p:cNvSpPr>
@@ -3480,13 +3100,7 @@
       </p:sp>
       <p:sp>
         <p:nvSpPr>
-          <p:cNvPr id="3" name="Content Placeholder 2">
-            <a:extLst>
-              <a:ext uri="{FF2B5EF4-FFF2-40B4-BE49-F238E27FC236}">
-                <a16:creationId xmlns:a16="http://schemas.microsoft.com/office/drawing/2014/main" id="{BAE3C732-6234-4B3D-98BC-5ED06B6D8BB0}"/>
-              </a:ext>
-            </a:extLst>
-          </p:cNvPr>
+          <p:cNvPr id="3" name="Content Placeholder 2"/>
           <p:cNvSpPr>
             <a:spLocks noGrp="1"/>
           </p:cNvSpPr>
@@ -3504,11 +3118,6 @@
         </p:txBody>
       </p:sp>
     </p:spTree>
-    <p:extLst>
-      <p:ext uri="{BB962C8B-B14F-4D97-AF65-F5344CB8AC3E}">
-        <p14:creationId xmlns:p14="http://schemas.microsoft.com/office/powerpoint/2010/main" val="1457174144"/>
-      </p:ext>
-    </p:extLst>
   </p:cSld>
   <p:clrMapOvr>
     <a:masterClrMapping/>
@@ -3535,13 +3144,7 @@
       </p:grpSpPr>
       <p:sp>
         <p:nvSpPr>
-          <p:cNvPr id="2" name="Title 1">
-            <a:extLst>
-              <a:ext uri="{FF2B5EF4-FFF2-40B4-BE49-F238E27FC236}">
-                <a16:creationId xmlns:a16="http://schemas.microsoft.com/office/drawing/2014/main" id="{57EE15F5-5CF3-400F-A715-C4F384C885CD}"/>
-              </a:ext>
-            </a:extLst>
-          </p:cNvPr>
+          <p:cNvPr id="2" name="Title 1"/>
           <p:cNvSpPr>
             <a:spLocks noGrp="1"/>
           </p:cNvSpPr>
@@ -3564,13 +3167,7 @@
       </p:sp>
       <p:sp>
         <p:nvSpPr>
-          <p:cNvPr id="3" name="Content Placeholder 2">
-            <a:extLst>
-              <a:ext uri="{FF2B5EF4-FFF2-40B4-BE49-F238E27FC236}">
-                <a16:creationId xmlns:a16="http://schemas.microsoft.com/office/drawing/2014/main" id="{65BA0569-E3C0-4946-8067-8AA7659D1568}"/>
-              </a:ext>
-            </a:extLst>
-          </p:cNvPr>
+          <p:cNvPr id="3" name="Content Placeholder 2"/>
           <p:cNvSpPr>
             <a:spLocks noGrp="1"/>
           </p:cNvSpPr>
@@ -3588,11 +3185,6 @@
         </p:txBody>
       </p:sp>
     </p:spTree>
-    <p:extLst>
-      <p:ext uri="{BB962C8B-B14F-4D97-AF65-F5344CB8AC3E}">
-        <p14:creationId xmlns:p14="http://schemas.microsoft.com/office/powerpoint/2010/main" val="1220778185"/>
-      </p:ext>
-    </p:extLst>
   </p:cSld>
   <p:clrMapOvr>
     <a:masterClrMapping/>
@@ -3619,13 +3211,7 @@
       </p:grpSpPr>
       <p:sp>
         <p:nvSpPr>
-          <p:cNvPr id="2" name="Title 1">
-            <a:extLst>
-              <a:ext uri="{FF2B5EF4-FFF2-40B4-BE49-F238E27FC236}">
-                <a16:creationId xmlns:a16="http://schemas.microsoft.com/office/drawing/2014/main" id="{33395521-DE30-42B2-8DFE-74217FFCF7EE}"/>
-              </a:ext>
-            </a:extLst>
-          </p:cNvPr>
+          <p:cNvPr id="2" name="Title 1"/>
           <p:cNvSpPr>
             <a:spLocks noGrp="1"/>
           </p:cNvSpPr>
@@ -3642,18 +3228,13 @@
               <a:rPr lang="en-SG" dirty="0"/>
               <a:t>lambda - key features/ architecture.</a:t>
             </a:r>
-          </a:p>
-        </p:txBody>
-      </p:sp>
-      <p:sp>
-        <p:nvSpPr>
-          <p:cNvPr id="3" name="Content Placeholder 2">
-            <a:extLst>
-              <a:ext uri="{FF2B5EF4-FFF2-40B4-BE49-F238E27FC236}">
-                <a16:creationId xmlns:a16="http://schemas.microsoft.com/office/drawing/2014/main" id="{3CB58D57-75EA-43C3-A812-2D2C4F03BACB}"/>
-              </a:ext>
-            </a:extLst>
-          </p:cNvPr>
+            <a:endParaRPr lang="en-SG" dirty="0"/>
+          </a:p>
+        </p:txBody>
+      </p:sp>
+      <p:sp>
+        <p:nvSpPr>
+          <p:cNvPr id="3" name="Content Placeholder 2"/>
           <p:cNvSpPr>
             <a:spLocks noGrp="1"/>
           </p:cNvSpPr>
@@ -3666,16 +3247,31 @@
           <a:bodyPr/>
           <a:lstStyle/>
           <a:p>
+            <a:r>
+              <a:rPr lang="en-SG"/>
+              <a:t>What is Lambda</a:t>
+            </a:r>
+            <a:endParaRPr lang="en-SG"/>
+          </a:p>
+          <a:p>
+            <a:pPr lvl="2"/>
+            <a:r>
+              <a:rPr lang="en-SG">
+                <a:sym typeface="+mn-ea"/>
+              </a:rPr>
+              <a:t>Lambda architecture describes a system consisting of three layers: batch processing, speed (or real-time) processing, and a serving layer for responding to queries</a:t>
+            </a:r>
+            <a:endParaRPr lang="en-SG">
+              <a:sym typeface="+mn-ea"/>
+            </a:endParaRPr>
+          </a:p>
+          <a:p>
+            <a:pPr lvl="2"/>
             <a:endParaRPr lang="en-SG"/>
           </a:p>
         </p:txBody>
       </p:sp>
     </p:spTree>
-    <p:extLst>
-      <p:ext uri="{BB962C8B-B14F-4D97-AF65-F5344CB8AC3E}">
-        <p14:creationId xmlns:p14="http://schemas.microsoft.com/office/powerpoint/2010/main" val="2263090588"/>
-      </p:ext>
-    </p:extLst>
   </p:cSld>
   <p:clrMapOvr>
     <a:masterClrMapping/>
@@ -3702,13 +3298,7 @@
       </p:grpSpPr>
       <p:sp>
         <p:nvSpPr>
-          <p:cNvPr id="2" name="Title 1">
-            <a:extLst>
-              <a:ext uri="{FF2B5EF4-FFF2-40B4-BE49-F238E27FC236}">
-                <a16:creationId xmlns:a16="http://schemas.microsoft.com/office/drawing/2014/main" id="{F12D4B0E-DCE7-4839-9D89-30E77B14A20F}"/>
-              </a:ext>
-            </a:extLst>
-          </p:cNvPr>
+          <p:cNvPr id="2" name="Title 1"/>
           <p:cNvSpPr>
             <a:spLocks noGrp="1"/>
           </p:cNvSpPr>
@@ -3725,18 +3315,13 @@
               <a:rPr lang="en-SG" dirty="0"/>
               <a:t>Problems with lambda.</a:t>
             </a:r>
-          </a:p>
-        </p:txBody>
-      </p:sp>
-      <p:sp>
-        <p:nvSpPr>
-          <p:cNvPr id="3" name="Content Placeholder 2">
-            <a:extLst>
-              <a:ext uri="{FF2B5EF4-FFF2-40B4-BE49-F238E27FC236}">
-                <a16:creationId xmlns:a16="http://schemas.microsoft.com/office/drawing/2014/main" id="{46470EB5-5332-445A-9E6B-AFF20FC158D7}"/>
-              </a:ext>
-            </a:extLst>
-          </p:cNvPr>
+            <a:endParaRPr lang="en-SG" dirty="0"/>
+          </a:p>
+        </p:txBody>
+      </p:sp>
+      <p:sp>
+        <p:nvSpPr>
+          <p:cNvPr id="3" name="Content Placeholder 2"/>
           <p:cNvSpPr>
             <a:spLocks noGrp="1"/>
           </p:cNvSpPr>
@@ -3754,11 +3339,6 @@
         </p:txBody>
       </p:sp>
     </p:spTree>
-    <p:extLst>
-      <p:ext uri="{BB962C8B-B14F-4D97-AF65-F5344CB8AC3E}">
-        <p14:creationId xmlns:p14="http://schemas.microsoft.com/office/powerpoint/2010/main" val="1507180220"/>
-      </p:ext>
-    </p:extLst>
   </p:cSld>
   <p:clrMapOvr>
     <a:masterClrMapping/>
@@ -3785,13 +3365,7 @@
       </p:grpSpPr>
       <p:sp>
         <p:nvSpPr>
-          <p:cNvPr id="2" name="Title 1">
-            <a:extLst>
-              <a:ext uri="{FF2B5EF4-FFF2-40B4-BE49-F238E27FC236}">
-                <a16:creationId xmlns:a16="http://schemas.microsoft.com/office/drawing/2014/main" id="{0F396BD5-6E7C-4008-80AA-4EC43AD94CBC}"/>
-              </a:ext>
-            </a:extLst>
-          </p:cNvPr>
+          <p:cNvPr id="2" name="Title 1"/>
           <p:cNvSpPr>
             <a:spLocks noGrp="1"/>
           </p:cNvSpPr>
@@ -3824,13 +3398,7 @@
       </p:sp>
       <p:sp>
         <p:nvSpPr>
-          <p:cNvPr id="3" name="Content Placeholder 2">
-            <a:extLst>
-              <a:ext uri="{FF2B5EF4-FFF2-40B4-BE49-F238E27FC236}">
-                <a16:creationId xmlns:a16="http://schemas.microsoft.com/office/drawing/2014/main" id="{56B5A36A-CFF7-42AB-A8E9-F03D807A000A}"/>
-              </a:ext>
-            </a:extLst>
-          </p:cNvPr>
+          <p:cNvPr id="3" name="Content Placeholder 2"/>
           <p:cNvSpPr>
             <a:spLocks noGrp="1"/>
           </p:cNvSpPr>
@@ -3843,16 +3411,39 @@
           <a:bodyPr/>
           <a:lstStyle/>
           <a:p>
+            <a:r>
+              <a:rPr lang="en-SG">
+                <a:sym typeface="+mn-ea"/>
+              </a:rPr>
+              <a:t>What is “Kappa architecture”?</a:t>
+            </a:r>
+            <a:endParaRPr lang="en-SG">
+              <a:sym typeface="+mn-ea"/>
+            </a:endParaRPr>
+          </a:p>
+          <a:p>
+            <a:endParaRPr lang="en-SG"/>
+          </a:p>
+          <a:p>
+            <a:r>
+              <a:rPr lang="en-SG"/>
+              <a:t>The Kappa architecture simplifies the Lambda architecture by removing the batch layer and replacing it with a streaming layer.</a:t>
+            </a:r>
+            <a:endParaRPr lang="en-SG"/>
+          </a:p>
+          <a:p>
+            <a:r>
+              <a:rPr lang="en-SG"/>
+              <a:t>A batch is a data set with a start and an end (bounded), while a stream has no start or end and is infinite (unbounded)</a:t>
+            </a:r>
+            <a:endParaRPr lang="en-SG"/>
+          </a:p>
+          <a:p>
             <a:endParaRPr lang="en-SG"/>
           </a:p>
         </p:txBody>
       </p:sp>
     </p:spTree>
-    <p:extLst>
-      <p:ext uri="{BB962C8B-B14F-4D97-AF65-F5344CB8AC3E}">
-        <p14:creationId xmlns:p14="http://schemas.microsoft.com/office/powerpoint/2010/main" val="4043529197"/>
-      </p:ext>
-    </p:extLst>
   </p:cSld>
   <p:clrMapOvr>
     <a:masterClrMapping/>
@@ -3879,13 +3470,7 @@
       </p:grpSpPr>
       <p:sp>
         <p:nvSpPr>
-          <p:cNvPr id="2" name="Title 1">
-            <a:extLst>
-              <a:ext uri="{FF2B5EF4-FFF2-40B4-BE49-F238E27FC236}">
-                <a16:creationId xmlns:a16="http://schemas.microsoft.com/office/drawing/2014/main" id="{C6F70953-0415-474B-B946-D0CE59C4B5C7}"/>
-              </a:ext>
-            </a:extLst>
-          </p:cNvPr>
+          <p:cNvPr id="2" name="Title 1"/>
           <p:cNvSpPr>
             <a:spLocks noGrp="1"/>
           </p:cNvSpPr>
@@ -3893,7 +3478,12 @@
             <p:ph type="title"/>
           </p:nvPr>
         </p:nvSpPr>
-        <p:spPr/>
+        <p:spPr>
+          <a:xfrm>
+            <a:off x="838200" y="325755"/>
+            <a:ext cx="10515600" cy="1325563"/>
+          </a:xfrm>
+        </p:spPr>
         <p:txBody>
           <a:bodyPr>
             <a:normAutofit fontScale="90000"/>
@@ -3918,13 +3508,7 @@
       </p:sp>
       <p:sp>
         <p:nvSpPr>
-          <p:cNvPr id="3" name="Content Placeholder 2">
-            <a:extLst>
-              <a:ext uri="{FF2B5EF4-FFF2-40B4-BE49-F238E27FC236}">
-                <a16:creationId xmlns:a16="http://schemas.microsoft.com/office/drawing/2014/main" id="{AF0344FC-078D-44A6-ADE2-D971CE714F35}"/>
-              </a:ext>
-            </a:extLst>
-          </p:cNvPr>
+          <p:cNvPr id="3" name="Content Placeholder 2"/>
           <p:cNvSpPr>
             <a:spLocks noGrp="1"/>
           </p:cNvSpPr>
@@ -3939,14 +3523,29 @@
           <a:p>
             <a:endParaRPr lang="en-SG"/>
           </a:p>
+          <a:p>
+            <a:pPr lvl="1"/>
+            <a:r>
+              <a:rPr lang="en-SG">
+                <a:sym typeface="+mn-ea"/>
+              </a:rPr>
+              <a:t>What is “Kappa architecture”?</a:t>
+            </a:r>
+            <a:endParaRPr lang="en-SG">
+              <a:sym typeface="+mn-ea"/>
+            </a:endParaRPr>
+          </a:p>
+          <a:p>
+            <a:pPr lvl="2"/>
+            <a:endParaRPr lang="en-SG"/>
+          </a:p>
+          <a:p>
+            <a:pPr lvl="2"/>
+            <a:endParaRPr lang="en-SG"/>
+          </a:p>
         </p:txBody>
       </p:sp>
     </p:spTree>
-    <p:extLst>
-      <p:ext uri="{BB962C8B-B14F-4D97-AF65-F5344CB8AC3E}">
-        <p14:creationId xmlns:p14="http://schemas.microsoft.com/office/powerpoint/2010/main" val="2154843786"/>
-      </p:ext>
-    </p:extLst>
   </p:cSld>
   <p:clrMapOvr>
     <a:masterClrMapping/>
@@ -3963,23 +3562,10 @@
         <p:cNvGrpSpPr/>
         <p:nvPr/>
       </p:nvGrpSpPr>
-      <p:grpSpPr>
-        <a:xfrm>
-          <a:off x="0" y="0"/>
-          <a:ext cx="0" cy="0"/>
-          <a:chOff x="0" y="0"/>
-          <a:chExt cx="0" cy="0"/>
-        </a:xfrm>
-      </p:grpSpPr>
-      <p:sp>
-        <p:nvSpPr>
-          <p:cNvPr id="2" name="Title 1">
-            <a:extLst>
-              <a:ext uri="{FF2B5EF4-FFF2-40B4-BE49-F238E27FC236}">
-                <a16:creationId xmlns:a16="http://schemas.microsoft.com/office/drawing/2014/main" id="{B72BC5AB-F734-462B-8A47-8CB8F4DBE3E8}"/>
-              </a:ext>
-            </a:extLst>
-          </p:cNvPr>
+      <p:grpSpPr/>
+      <p:sp>
+        <p:nvSpPr>
+          <p:cNvPr id="2" name="Title 1"/>
           <p:cNvSpPr>
             <a:spLocks noGrp="1"/>
           </p:cNvSpPr>
@@ -3989,58 +3575,44 @@
         </p:nvSpPr>
         <p:spPr/>
         <p:txBody>
-          <a:bodyPr>
-            <a:normAutofit fontScale="90000"/>
-          </a:bodyPr>
-          <a:lstStyle/>
-          <a:p>
-            <a:r>
-              <a:rPr lang="en-SG" dirty="0"/>
-              <a:t>Problems with Kappa  </a:t>
-            </a:r>
-            <a:br>
-              <a:rPr lang="en-SG" b="0" dirty="0">
-                <a:effectLst/>
-              </a:rPr>
-            </a:br>
-            <a:br>
-              <a:rPr lang="en-SG" dirty="0"/>
-            </a:br>
-            <a:endParaRPr lang="en-SG" dirty="0"/>
-          </a:p>
-        </p:txBody>
-      </p:sp>
-      <p:sp>
-        <p:nvSpPr>
-          <p:cNvPr id="3" name="Content Placeholder 2">
-            <a:extLst>
-              <a:ext uri="{FF2B5EF4-FFF2-40B4-BE49-F238E27FC236}">
-                <a16:creationId xmlns:a16="http://schemas.microsoft.com/office/drawing/2014/main" id="{519C31DA-87BA-4A33-BB9D-FDF6EFA4A35C}"/>
-              </a:ext>
-            </a:extLst>
-          </p:cNvPr>
-          <p:cNvSpPr>
-            <a:spLocks noGrp="1"/>
-          </p:cNvSpPr>
+          <a:bodyPr/>
+          <a:p>
+            <a:pPr algn="ctr"/>
+            <a:r>
+              <a:rPr lang="en-SG" altLang="en-US"/>
+              <a:t>Kappa Architecture</a:t>
+            </a:r>
+            <a:endParaRPr lang="en-SG" altLang="en-US"/>
+          </a:p>
+        </p:txBody>
+      </p:sp>
+      <p:pic>
+        <p:nvPicPr>
+          <p:cNvPr id="4" name="Content Placeholder 3" descr="Kappa"/>
+          <p:cNvPicPr>
+            <a:picLocks noChangeAspect="1"/>
+          </p:cNvPicPr>
           <p:nvPr>
             <p:ph idx="1"/>
           </p:nvPr>
-        </p:nvSpPr>
-        <p:spPr/>
-        <p:txBody>
-          <a:bodyPr/>
-          <a:lstStyle/>
-          <a:p>
-            <a:endParaRPr lang="en-SG"/>
-          </a:p>
-        </p:txBody>
-      </p:sp>
+        </p:nvPicPr>
+        <p:blipFill>
+          <a:blip r:embed="rId1"/>
+          <a:stretch>
+            <a:fillRect/>
+          </a:stretch>
+        </p:blipFill>
+        <p:spPr>
+          <a:xfrm>
+            <a:off x="581660" y="1810385"/>
+            <a:ext cx="10772140" cy="4382770"/>
+          </a:xfrm>
+          <a:prstGeom prst="rect">
+            <a:avLst/>
+          </a:prstGeom>
+        </p:spPr>
+      </p:pic>
     </p:spTree>
-    <p:extLst>
-      <p:ext uri="{BB962C8B-B14F-4D97-AF65-F5344CB8AC3E}">
-        <p14:creationId xmlns:p14="http://schemas.microsoft.com/office/powerpoint/2010/main" val="18636457"/>
-      </p:ext>
-    </p:extLst>
   </p:cSld>
   <p:clrMapOvr>
     <a:masterClrMapping/>
@@ -4067,13 +3639,7 @@
       </p:grpSpPr>
       <p:sp>
         <p:nvSpPr>
-          <p:cNvPr id="2" name="Title 1">
-            <a:extLst>
-              <a:ext uri="{FF2B5EF4-FFF2-40B4-BE49-F238E27FC236}">
-                <a16:creationId xmlns:a16="http://schemas.microsoft.com/office/drawing/2014/main" id="{ED19D992-4A9B-4FBC-BB08-C6A133DA89A1}"/>
-              </a:ext>
-            </a:extLst>
-          </p:cNvPr>
+          <p:cNvPr id="2" name="Title 1"/>
           <p:cNvSpPr>
             <a:spLocks noGrp="1"/>
           </p:cNvSpPr>
@@ -4090,7 +3656,7 @@
           <a:p>
             <a:r>
               <a:rPr lang="en-SG" dirty="0"/>
-              <a:t>Business scenarios</a:t>
+              <a:t>Problems with Kappa  </a:t>
             </a:r>
             <a:br>
               <a:rPr lang="en-SG" b="0" dirty="0">
@@ -4106,13 +3672,7 @@
       </p:sp>
       <p:sp>
         <p:nvSpPr>
-          <p:cNvPr id="3" name="Content Placeholder 2">
-            <a:extLst>
-              <a:ext uri="{FF2B5EF4-FFF2-40B4-BE49-F238E27FC236}">
-                <a16:creationId xmlns:a16="http://schemas.microsoft.com/office/drawing/2014/main" id="{DEA9AC12-017E-4551-863F-35239001053F}"/>
-              </a:ext>
-            </a:extLst>
-          </p:cNvPr>
+          <p:cNvPr id="3" name="Content Placeholder 2"/>
           <p:cNvSpPr>
             <a:spLocks noGrp="1"/>
           </p:cNvSpPr>
@@ -4130,11 +3690,6 @@
         </p:txBody>
       </p:sp>
     </p:spTree>
-    <p:extLst>
-      <p:ext uri="{BB962C8B-B14F-4D97-AF65-F5344CB8AC3E}">
-        <p14:creationId xmlns:p14="http://schemas.microsoft.com/office/powerpoint/2010/main" val="2002914700"/>
-      </p:ext>
-    </p:extLst>
   </p:cSld>
   <p:clrMapOvr>
     <a:masterClrMapping/>
@@ -4161,13 +3716,7 @@
       </p:grpSpPr>
       <p:sp>
         <p:nvSpPr>
-          <p:cNvPr id="2" name="Title 1">
-            <a:extLst>
-              <a:ext uri="{FF2B5EF4-FFF2-40B4-BE49-F238E27FC236}">
-                <a16:creationId xmlns:a16="http://schemas.microsoft.com/office/drawing/2014/main" id="{51520391-8FFC-4EF0-9C19-9103D28B3E18}"/>
-              </a:ext>
-            </a:extLst>
-          </p:cNvPr>
+          <p:cNvPr id="2" name="Title 1"/>
           <p:cNvSpPr>
             <a:spLocks noGrp="1"/>
           </p:cNvSpPr>
@@ -4177,25 +3726,30 @@
         </p:nvSpPr>
         <p:spPr/>
         <p:txBody>
-          <a:bodyPr/>
+          <a:bodyPr>
+            <a:normAutofit fontScale="90000"/>
+          </a:bodyPr>
           <a:lstStyle/>
           <a:p>
             <a:r>
               <a:rPr lang="en-SG" dirty="0"/>
-              <a:t>Zeta</a:t>
-            </a:r>
-          </a:p>
-        </p:txBody>
-      </p:sp>
-      <p:sp>
-        <p:nvSpPr>
-          <p:cNvPr id="3" name="Content Placeholder 2">
-            <a:extLst>
-              <a:ext uri="{FF2B5EF4-FFF2-40B4-BE49-F238E27FC236}">
-                <a16:creationId xmlns:a16="http://schemas.microsoft.com/office/drawing/2014/main" id="{9672CA1D-C767-4384-86FE-698E24C96F70}"/>
-              </a:ext>
-            </a:extLst>
-          </p:cNvPr>
+              <a:t>Business scenarios</a:t>
+            </a:r>
+            <a:br>
+              <a:rPr lang="en-SG" b="0" dirty="0">
+                <a:effectLst/>
+              </a:rPr>
+            </a:br>
+            <a:br>
+              <a:rPr lang="en-SG" dirty="0"/>
+            </a:br>
+            <a:endParaRPr lang="en-SG" dirty="0"/>
+          </a:p>
+        </p:txBody>
+      </p:sp>
+      <p:sp>
+        <p:nvSpPr>
+          <p:cNvPr id="3" name="Content Placeholder 2"/>
           <p:cNvSpPr>
             <a:spLocks noGrp="1"/>
           </p:cNvSpPr>
@@ -4208,16 +3762,25 @@
           <a:bodyPr/>
           <a:lstStyle/>
           <a:p>
+            <a:r>
+              <a:rPr lang="en-SG"/>
+              <a:t>The Lambda Architecture is aimed at applications built around complex asynchronous transformations that need to run with low latency. </a:t>
+            </a:r>
+            <a:endParaRPr lang="en-SG"/>
+          </a:p>
+          <a:p>
+            <a:r>
+              <a:rPr lang="en-SG"/>
+              <a:t>A good example would be a news recommendation system that needs to crawl various news sources, process and normalize all the input, and then index, rank, and store it for serving.</a:t>
+            </a:r>
+            <a:endParaRPr lang="en-SG"/>
+          </a:p>
+          <a:p>
             <a:endParaRPr lang="en-SG"/>
           </a:p>
         </p:txBody>
       </p:sp>
     </p:spTree>
-    <p:extLst>
-      <p:ext uri="{BB962C8B-B14F-4D97-AF65-F5344CB8AC3E}">
-        <p14:creationId xmlns:p14="http://schemas.microsoft.com/office/powerpoint/2010/main" val="3867575597"/>
-      </p:ext>
-    </p:extLst>
   </p:cSld>
   <p:clrMapOvr>
     <a:masterClrMapping/>
@@ -4268,7 +3831,7 @@
     </a:clrScheme>
     <a:fontScheme name="Office">
       <a:majorFont>
-        <a:latin typeface="Calibri Light" panose="020F0302020204030204"/>
+        <a:latin typeface="Calibri Light"/>
         <a:ea typeface=""/>
         <a:cs typeface=""/>
         <a:font script="Jpan" typeface="游ゴシック Light"/>
@@ -4301,26 +3864,9 @@
         <a:font script="Viet" typeface="Times New Roman"/>
         <a:font script="Uigh" typeface="Microsoft Uighur"/>
         <a:font script="Geor" typeface="Sylfaen"/>
-        <a:font script="Armn" typeface="Arial"/>
-        <a:font script="Bugi" typeface="Leelawadee UI"/>
-        <a:font script="Bopo" typeface="Microsoft JhengHei"/>
-        <a:font script="Java" typeface="Javanese Text"/>
-        <a:font script="Lisu" typeface="Segoe UI"/>
-        <a:font script="Mymr" typeface="Myanmar Text"/>
-        <a:font script="Nkoo" typeface="Ebrima"/>
-        <a:font script="Olck" typeface="Nirmala UI"/>
-        <a:font script="Osma" typeface="Ebrima"/>
-        <a:font script="Phag" typeface="Phagspa"/>
-        <a:font script="Syrn" typeface="Estrangelo Edessa"/>
-        <a:font script="Syrj" typeface="Estrangelo Edessa"/>
-        <a:font script="Syre" typeface="Estrangelo Edessa"/>
-        <a:font script="Sora" typeface="Nirmala UI"/>
-        <a:font script="Tale" typeface="Microsoft Tai Le"/>
-        <a:font script="Talu" typeface="Microsoft New Tai Lue"/>
-        <a:font script="Tfng" typeface="Ebrima"/>
       </a:majorFont>
       <a:minorFont>
-        <a:latin typeface="Calibri" panose="020F0502020204030204"/>
+        <a:latin typeface="Calibri"/>
         <a:ea typeface=""/>
         <a:cs typeface=""/>
         <a:font script="Jpan" typeface="游ゴシック"/>
@@ -4353,23 +3899,6 @@
         <a:font script="Viet" typeface="Arial"/>
         <a:font script="Uigh" typeface="Microsoft Uighur"/>
         <a:font script="Geor" typeface="Sylfaen"/>
-        <a:font script="Armn" typeface="Arial"/>
-        <a:font script="Bugi" typeface="Leelawadee UI"/>
-        <a:font script="Bopo" typeface="Microsoft JhengHei"/>
-        <a:font script="Java" typeface="Javanese Text"/>
-        <a:font script="Lisu" typeface="Segoe UI"/>
-        <a:font script="Mymr" typeface="Myanmar Text"/>
-        <a:font script="Nkoo" typeface="Ebrima"/>
-        <a:font script="Olck" typeface="Nirmala UI"/>
-        <a:font script="Osma" typeface="Ebrima"/>
-        <a:font script="Phag" typeface="Phagspa"/>
-        <a:font script="Syrn" typeface="Estrangelo Edessa"/>
-        <a:font script="Syrj" typeface="Estrangelo Edessa"/>
-        <a:font script="Syre" typeface="Estrangelo Edessa"/>
-        <a:font script="Sora" typeface="Nirmala UI"/>
-        <a:font script="Tale" typeface="Microsoft Tai Le"/>
-        <a:font script="Talu" typeface="Microsoft New Tai Lue"/>
-        <a:font script="Tfng" typeface="Ebrima"/>
       </a:minorFont>
     </a:fontScheme>
     <a:fmtScheme name="Office">
@@ -4510,8 +4039,6 @@
       </a:bgFillStyleLst>
     </a:fmtScheme>
   </a:themeElements>
-  <a:objectDefaults/>
-  <a:extraClrSchemeLst/>
   <a:extLst>
     <a:ext uri="{05A4C25C-085E-4340-85A3-A5531E510DB2}">
       <thm15:themeFamily xmlns:thm15="http://schemas.microsoft.com/office/thememl/2012/main" name="Office Theme" id="{62F939B6-93AF-4DB8-9C6B-D6C7DFDC589F}" vid="{4A3C46E8-61CC-4603-A589-7422A47A8E4A}"/>

</xml_diff>

<commit_message>
Updated few more slides
</commit_message>
<xml_diff>
--- a/ArchCA.pptx
+++ b/ArchCA.pptx
@@ -10,8 +10,8 @@
     <p:sldId id="257" r:id="rId5"/>
     <p:sldId id="259" r:id="rId6"/>
     <p:sldId id="260" r:id="rId7"/>
-    <p:sldId id="261" r:id="rId8"/>
-    <p:sldId id="267" r:id="rId9"/>
+    <p:sldId id="267" r:id="rId8"/>
+    <p:sldId id="261" r:id="rId9"/>
     <p:sldId id="262" r:id="rId10"/>
     <p:sldId id="263" r:id="rId11"/>
     <p:sldId id="264" r:id="rId12"/>
@@ -3259,8 +3259,14 @@
               <a:rPr lang="en-SG">
                 <a:sym typeface="+mn-ea"/>
               </a:rPr>
-              <a:t>Lambda architecture describes a system consisting of three layers: batch processing, speed (or real-time) processing, and a serving layer for responding to queries</a:t>
-            </a:r>
+              <a:t>Lambda architecture describes a system consisting of three layers: batch processing, speed (or real-time) processing, and a serving layer for responding to queries.</a:t>
+            </a:r>
+            <a:endParaRPr lang="en-SG">
+              <a:sym typeface="+mn-ea"/>
+            </a:endParaRPr>
+          </a:p>
+          <a:p>
+            <a:pPr lvl="2"/>
             <a:endParaRPr lang="en-SG">
               <a:sym typeface="+mn-ea"/>
             </a:endParaRPr>
@@ -3460,108 +3466,6 @@
         <p:cNvGrpSpPr/>
         <p:nvPr/>
       </p:nvGrpSpPr>
-      <p:grpSpPr>
-        <a:xfrm>
-          <a:off x="0" y="0"/>
-          <a:ext cx="0" cy="0"/>
-          <a:chOff x="0" y="0"/>
-          <a:chExt cx="0" cy="0"/>
-        </a:xfrm>
-      </p:grpSpPr>
-      <p:sp>
-        <p:nvSpPr>
-          <p:cNvPr id="2" name="Title 1"/>
-          <p:cNvSpPr>
-            <a:spLocks noGrp="1"/>
-          </p:cNvSpPr>
-          <p:nvPr>
-            <p:ph type="title"/>
-          </p:nvPr>
-        </p:nvSpPr>
-        <p:spPr>
-          <a:xfrm>
-            <a:off x="838200" y="325755"/>
-            <a:ext cx="10515600" cy="1325563"/>
-          </a:xfrm>
-        </p:spPr>
-        <p:txBody>
-          <a:bodyPr>
-            <a:normAutofit fontScale="90000"/>
-          </a:bodyPr>
-          <a:lstStyle/>
-          <a:p>
-            <a:r>
-              <a:rPr lang="en-SG" dirty="0"/>
-              <a:t>Architecture description</a:t>
-            </a:r>
-            <a:br>
-              <a:rPr lang="en-SG" b="0" dirty="0">
-                <a:effectLst/>
-              </a:rPr>
-            </a:br>
-            <a:br>
-              <a:rPr lang="en-SG" dirty="0"/>
-            </a:br>
-            <a:endParaRPr lang="en-SG" dirty="0"/>
-          </a:p>
-        </p:txBody>
-      </p:sp>
-      <p:sp>
-        <p:nvSpPr>
-          <p:cNvPr id="3" name="Content Placeholder 2"/>
-          <p:cNvSpPr>
-            <a:spLocks noGrp="1"/>
-          </p:cNvSpPr>
-          <p:nvPr>
-            <p:ph idx="1"/>
-          </p:nvPr>
-        </p:nvSpPr>
-        <p:spPr/>
-        <p:txBody>
-          <a:bodyPr/>
-          <a:lstStyle/>
-          <a:p>
-            <a:endParaRPr lang="en-SG"/>
-          </a:p>
-          <a:p>
-            <a:pPr lvl="1"/>
-            <a:r>
-              <a:rPr lang="en-SG">
-                <a:sym typeface="+mn-ea"/>
-              </a:rPr>
-              <a:t>What is “Kappa architecture”?</a:t>
-            </a:r>
-            <a:endParaRPr lang="en-SG">
-              <a:sym typeface="+mn-ea"/>
-            </a:endParaRPr>
-          </a:p>
-          <a:p>
-            <a:pPr lvl="2"/>
-            <a:endParaRPr lang="en-SG"/>
-          </a:p>
-          <a:p>
-            <a:pPr lvl="2"/>
-            <a:endParaRPr lang="en-SG"/>
-          </a:p>
-        </p:txBody>
-      </p:sp>
-    </p:spTree>
-  </p:cSld>
-  <p:clrMapOvr>
-    <a:masterClrMapping/>
-  </p:clrMapOvr>
-</p:sld>
-</file>
-
-<file path=ppt/slides/slide7.xml><?xml version="1.0" encoding="utf-8"?>
-<p:sld xmlns:a="http://schemas.openxmlformats.org/drawingml/2006/main" xmlns:r="http://schemas.openxmlformats.org/officeDocument/2006/relationships" xmlns:p="http://schemas.openxmlformats.org/presentationml/2006/main">
-  <p:cSld>
-    <p:spTree>
-      <p:nvGrpSpPr>
-        <p:cNvPr id="1" name=""/>
-        <p:cNvGrpSpPr/>
-        <p:nvPr/>
-      </p:nvGrpSpPr>
       <p:grpSpPr/>
       <p:sp>
         <p:nvSpPr>
@@ -3620,6 +3524,117 @@
 </p:sld>
 </file>
 
+<file path=ppt/slides/slide7.xml><?xml version="1.0" encoding="utf-8"?>
+<p:sld xmlns:a="http://schemas.openxmlformats.org/drawingml/2006/main" xmlns:r="http://schemas.openxmlformats.org/officeDocument/2006/relationships" xmlns:p="http://schemas.openxmlformats.org/presentationml/2006/main">
+  <p:cSld>
+    <p:spTree>
+      <p:nvGrpSpPr>
+        <p:cNvPr id="1" name=""/>
+        <p:cNvGrpSpPr/>
+        <p:nvPr/>
+      </p:nvGrpSpPr>
+      <p:grpSpPr>
+        <a:xfrm>
+          <a:off x="0" y="0"/>
+          <a:ext cx="0" cy="0"/>
+          <a:chOff x="0" y="0"/>
+          <a:chExt cx="0" cy="0"/>
+        </a:xfrm>
+      </p:grpSpPr>
+      <p:sp>
+        <p:nvSpPr>
+          <p:cNvPr id="2" name="Title 1"/>
+          <p:cNvSpPr>
+            <a:spLocks noGrp="1"/>
+          </p:cNvSpPr>
+          <p:nvPr>
+            <p:ph type="title"/>
+          </p:nvPr>
+        </p:nvSpPr>
+        <p:spPr>
+          <a:xfrm>
+            <a:off x="838200" y="325755"/>
+            <a:ext cx="10515600" cy="1325563"/>
+          </a:xfrm>
+        </p:spPr>
+        <p:txBody>
+          <a:bodyPr>
+            <a:normAutofit fontScale="90000"/>
+          </a:bodyPr>
+          <a:lstStyle/>
+          <a:p>
+            <a:r>
+              <a:rPr lang="en-SG" dirty="0"/>
+              <a:t>Architecture description</a:t>
+            </a:r>
+            <a:br>
+              <a:rPr lang="en-SG" b="0" dirty="0">
+                <a:effectLst/>
+              </a:rPr>
+            </a:br>
+            <a:br>
+              <a:rPr lang="en-SG" dirty="0"/>
+            </a:br>
+            <a:endParaRPr lang="en-SG" dirty="0"/>
+          </a:p>
+        </p:txBody>
+      </p:sp>
+      <p:sp>
+        <p:nvSpPr>
+          <p:cNvPr id="3" name="Content Placeholder 2"/>
+          <p:cNvSpPr>
+            <a:spLocks noGrp="1"/>
+          </p:cNvSpPr>
+          <p:nvPr>
+            <p:ph idx="1"/>
+          </p:nvPr>
+        </p:nvSpPr>
+        <p:spPr/>
+        <p:txBody>
+          <a:bodyPr/>
+          <a:lstStyle/>
+          <a:p>
+            <a:pPr marL="0" indent="0">
+              <a:buNone/>
+            </a:pPr>
+            <a:r>
+              <a:rPr lang="en-SG" sz="2400">
+                <a:sym typeface="+mn-ea"/>
+              </a:rPr>
+              <a:t>The Lambda Architecture is too complex if you only need to do event processing.</a:t>
+            </a:r>
+            <a:endParaRPr lang="en-SG" sz="2400"/>
+          </a:p>
+          <a:p>
+            <a:pPr lvl="2"/>
+            <a:r>
+              <a:rPr lang="en-SG"/>
+              <a:t>data stream processing or “real-time” processing of “live” discrete events.</a:t>
+            </a:r>
+            <a:endParaRPr lang="en-SG"/>
+          </a:p>
+          <a:p>
+            <a:pPr lvl="2"/>
+            <a:r>
+              <a:rPr lang="en-SG"/>
+              <a:t>Examples -  events emitted by devices from the Internet of Things (IoT), social networks, log files or transaction processing systems. </a:t>
+            </a:r>
+            <a:endParaRPr lang="en-SG"/>
+          </a:p>
+          <a:p>
+            <a:pPr lvl="2"/>
+            <a:endParaRPr lang="en-SG"/>
+          </a:p>
+        </p:txBody>
+      </p:sp>
+    </p:spTree>
+  </p:cSld>
+  <p:clrMapOvr>
+    <a:masterClrMapping/>
+  </p:clrMapOvr>
+</p:sld>
+</file>
+
 <file path=ppt/slides/slide8.xml><?xml version="1.0" encoding="utf-8"?>
 <p:sld xmlns:a="http://schemas.openxmlformats.org/drawingml/2006/main" xmlns:r="http://schemas.openxmlformats.org/officeDocument/2006/relationships" xmlns:p="http://schemas.openxmlformats.org/presentationml/2006/main">
   <p:cSld>
@@ -3685,6 +3700,10 @@
           <a:bodyPr/>
           <a:lstStyle/>
           <a:p>
+            <a:r>
+              <a:rPr lang="en-SG"/>
+              <a:t>The Kappa Architecture seems to be intriguing due to its simplification in comparison to the Lambda architecture, not everything can be conceptualized as events. For example, company balance sheets, end of the month reports, quarterly publications etc. should not be forced to be represented as events.</a:t>
+            </a:r>
             <a:endParaRPr lang="en-SG"/>
           </a:p>
         </p:txBody>

</xml_diff>